<commit_message>
motivation figure update deploy script IMDB dataset wrapper vadam acceleration
</commit_message>
<xml_diff>
--- a/fig/演示文稿1.pptx
+++ b/fig/演示文稿1.pptx
@@ -105,6 +105,11 @@
       </a:defRPr>
     </a:lvl9pPr>
   </p:defaultTextStyle>
+  <p:extLst>
+    <p:ext uri="{EFAFB233-063F-42B5-8137-9DF3F51BA10A}">
+      <p15:sldGuideLst xmlns:p15="http://schemas.microsoft.com/office/powerpoint/2012/main"/>
+    </p:ext>
+  </p:extLst>
 </p:presentation>
 </file>
 
@@ -255,7 +260,7 @@
           <a:p>
             <a:fld id="{8F27BD3B-15C5-4116-87CF-B26CBD3233A6}" type="datetimeFigureOut">
               <a:rPr lang="zh-CN" altLang="en-US" smtClean="0"/>
-              <a:t>2020/1/6</a:t>
+              <a:t>2020/1/14</a:t>
             </a:fld>
             <a:endParaRPr lang="zh-CN" altLang="en-US"/>
           </a:p>
@@ -453,7 +458,7 @@
           <a:p>
             <a:fld id="{8F27BD3B-15C5-4116-87CF-B26CBD3233A6}" type="datetimeFigureOut">
               <a:rPr lang="zh-CN" altLang="en-US" smtClean="0"/>
-              <a:t>2020/1/6</a:t>
+              <a:t>2020/1/14</a:t>
             </a:fld>
             <a:endParaRPr lang="zh-CN" altLang="en-US"/>
           </a:p>
@@ -661,7 +666,7 @@
           <a:p>
             <a:fld id="{8F27BD3B-15C5-4116-87CF-B26CBD3233A6}" type="datetimeFigureOut">
               <a:rPr lang="zh-CN" altLang="en-US" smtClean="0"/>
-              <a:t>2020/1/6</a:t>
+              <a:t>2020/1/14</a:t>
             </a:fld>
             <a:endParaRPr lang="zh-CN" altLang="en-US"/>
           </a:p>
@@ -859,7 +864,7 @@
           <a:p>
             <a:fld id="{8F27BD3B-15C5-4116-87CF-B26CBD3233A6}" type="datetimeFigureOut">
               <a:rPr lang="zh-CN" altLang="en-US" smtClean="0"/>
-              <a:t>2020/1/6</a:t>
+              <a:t>2020/1/14</a:t>
             </a:fld>
             <a:endParaRPr lang="zh-CN" altLang="en-US"/>
           </a:p>
@@ -1134,7 +1139,7 @@
           <a:p>
             <a:fld id="{8F27BD3B-15C5-4116-87CF-B26CBD3233A6}" type="datetimeFigureOut">
               <a:rPr lang="zh-CN" altLang="en-US" smtClean="0"/>
-              <a:t>2020/1/6</a:t>
+              <a:t>2020/1/14</a:t>
             </a:fld>
             <a:endParaRPr lang="zh-CN" altLang="en-US"/>
           </a:p>
@@ -1399,7 +1404,7 @@
           <a:p>
             <a:fld id="{8F27BD3B-15C5-4116-87CF-B26CBD3233A6}" type="datetimeFigureOut">
               <a:rPr lang="zh-CN" altLang="en-US" smtClean="0"/>
-              <a:t>2020/1/6</a:t>
+              <a:t>2020/1/14</a:t>
             </a:fld>
             <a:endParaRPr lang="zh-CN" altLang="en-US"/>
           </a:p>
@@ -1811,7 +1816,7 @@
           <a:p>
             <a:fld id="{8F27BD3B-15C5-4116-87CF-B26CBD3233A6}" type="datetimeFigureOut">
               <a:rPr lang="zh-CN" altLang="en-US" smtClean="0"/>
-              <a:t>2020/1/6</a:t>
+              <a:t>2020/1/14</a:t>
             </a:fld>
             <a:endParaRPr lang="zh-CN" altLang="en-US"/>
           </a:p>
@@ -1952,7 +1957,7 @@
           <a:p>
             <a:fld id="{8F27BD3B-15C5-4116-87CF-B26CBD3233A6}" type="datetimeFigureOut">
               <a:rPr lang="zh-CN" altLang="en-US" smtClean="0"/>
-              <a:t>2020/1/6</a:t>
+              <a:t>2020/1/14</a:t>
             </a:fld>
             <a:endParaRPr lang="zh-CN" altLang="en-US"/>
           </a:p>
@@ -2065,7 +2070,7 @@
           <a:p>
             <a:fld id="{8F27BD3B-15C5-4116-87CF-B26CBD3233A6}" type="datetimeFigureOut">
               <a:rPr lang="zh-CN" altLang="en-US" smtClean="0"/>
-              <a:t>2020/1/6</a:t>
+              <a:t>2020/1/14</a:t>
             </a:fld>
             <a:endParaRPr lang="zh-CN" altLang="en-US"/>
           </a:p>
@@ -2376,7 +2381,7 @@
           <a:p>
             <a:fld id="{8F27BD3B-15C5-4116-87CF-B26CBD3233A6}" type="datetimeFigureOut">
               <a:rPr lang="zh-CN" altLang="en-US" smtClean="0"/>
-              <a:t>2020/1/6</a:t>
+              <a:t>2020/1/14</a:t>
             </a:fld>
             <a:endParaRPr lang="zh-CN" altLang="en-US"/>
           </a:p>
@@ -2664,7 +2669,7 @@
           <a:p>
             <a:fld id="{8F27BD3B-15C5-4116-87CF-B26CBD3233A6}" type="datetimeFigureOut">
               <a:rPr lang="zh-CN" altLang="en-US" smtClean="0"/>
-              <a:t>2020/1/6</a:t>
+              <a:t>2020/1/14</a:t>
             </a:fld>
             <a:endParaRPr lang="zh-CN" altLang="en-US"/>
           </a:p>
@@ -2905,7 +2910,7 @@
           <a:p>
             <a:fld id="{8F27BD3B-15C5-4116-87CF-B26CBD3233A6}" type="datetimeFigureOut">
               <a:rPr lang="zh-CN" altLang="en-US" smtClean="0"/>
-              <a:t>2020/1/6</a:t>
+              <a:t>2020/1/14</a:t>
             </a:fld>
             <a:endParaRPr lang="zh-CN" altLang="en-US"/>
           </a:p>
@@ -3801,7 +3806,7 @@
             <p:spPr>
               <a:xfrm>
                 <a:off x="1344144" y="357194"/>
-                <a:ext cx="2407006" cy="540020"/>
+                <a:ext cx="2328458" cy="540020"/>
               </a:xfrm>
               <a:prstGeom prst="rect">
                 <a:avLst/>
@@ -3814,6 +3819,7 @@
               </a:bodyPr>
               <a:lstStyle/>
               <a:p>
+                <a:pPr/>
                 <a14:m>
                   <m:oMathPara xmlns:m="http://schemas.openxmlformats.org/officeDocument/2006/math">
                     <m:oMathParaPr>
@@ -3932,13 +3938,11 @@
                         <m:t>−</m:t>
                       </m:r>
                       <m:r>
-                        <a:rPr lang="en-US" altLang="zh-CN" b="1" i="1" smtClean="0">
-                          <a:solidFill>
-                            <a:schemeClr val="accent5"/>
-                          </a:solidFill>
+                        <a:rPr lang="en-US" altLang="zh-CN" b="0" i="1" smtClean="0">
                           <a:latin typeface="Cambria Math" panose="02040503050406030204" pitchFamily="18" charset="0"/>
+                          <a:ea typeface="Cambria Math" panose="02040503050406030204" pitchFamily="18" charset="0"/>
                         </a:rPr>
-                        <m:t>𝒍𝒓</m:t>
+                        <m:t>𝝀</m:t>
                       </m:r>
                       <m:f>
                         <m:fPr>
@@ -4066,7 +4070,7 @@
             <p:spPr>
               <a:xfrm>
                 <a:off x="1344144" y="357194"/>
-                <a:ext cx="2407006" cy="540020"/>
+                <a:ext cx="2328458" cy="540020"/>
               </a:xfrm>
               <a:prstGeom prst="rect">
                 <a:avLst/>
@@ -4074,7 +4078,7 @@
               <a:blipFill>
                 <a:blip r:embed="rId2"/>
                 <a:stretch>
-                  <a:fillRect b="-1136"/>
+                  <a:fillRect l="-1630" b="-2273"/>
                 </a:stretch>
               </a:blipFill>
             </p:spPr>
@@ -4083,7 +4087,7 @@
               <a:lstStyle/>
               <a:p>
                 <a:r>
-                  <a:rPr lang="zh-CN" altLang="en-US">
+                  <a:rPr lang="en-US">
                     <a:noFill/>
                   </a:rPr>
                   <a:t> </a:t>
@@ -4341,6 +4345,124 @@
               </a:bodyPr>
               <a:lstStyle/>
               <a:p>
+                <a:pPr/>
+                <a14:m>
+                  <m:oMathPara xmlns:m="http://schemas.openxmlformats.org/officeDocument/2006/math">
+                    <m:oMathParaPr>
+                      <m:jc m:val="centerGroup"/>
+                    </m:oMathParaPr>
+                    <m:oMath xmlns:m="http://schemas.openxmlformats.org/officeDocument/2006/math">
+                      <m:r>
+                        <a:rPr lang="en-US" altLang="zh-CN" b="1" i="1" smtClean="0">
+                          <a:solidFill>
+                            <a:srgbClr val="7030A0"/>
+                          </a:solidFill>
+                          <a:latin typeface="Cambria Math" panose="02040503050406030204" pitchFamily="18" charset="0"/>
+                        </a:rPr>
+                        <m:t>𝜶</m:t>
+                      </m:r>
+                      <m:r>
+                        <a:rPr lang="en-US" altLang="zh-CN" b="1" i="1" smtClean="0">
+                          <a:solidFill>
+                            <a:srgbClr val="7030A0"/>
+                          </a:solidFill>
+                          <a:latin typeface="Cambria Math" panose="02040503050406030204" pitchFamily="18" charset="0"/>
+                        </a:rPr>
+                        <m:t>&lt;</m:t>
+                      </m:r>
+                      <m:r>
+                        <a:rPr lang="en-US" altLang="zh-CN" b="1" i="1" smtClean="0">
+                          <a:solidFill>
+                            <a:srgbClr val="7030A0"/>
+                          </a:solidFill>
+                          <a:latin typeface="Cambria Math" panose="02040503050406030204" pitchFamily="18" charset="0"/>
+                        </a:rPr>
+                        <m:t>𝟎</m:t>
+                      </m:r>
+                    </m:oMath>
+                  </m:oMathPara>
+                </a14:m>
+                <a:endParaRPr lang="zh-CN" altLang="en-US" b="1" dirty="0"/>
+              </a:p>
+            </p:txBody>
+          </p:sp>
+        </mc:Choice>
+        <mc:Fallback>
+          <p:sp>
+            <p:nvSpPr>
+              <p:cNvPr id="66" name="文本框 65">
+                <a:extLst>
+                  <a:ext uri="{FF2B5EF4-FFF2-40B4-BE49-F238E27FC236}">
+                    <a16:creationId xmlns:a16="http://schemas.microsoft.com/office/drawing/2014/main" id="{E5245C6F-8A82-4FA4-AC7E-3D4BD0B9225A}"/>
+                  </a:ext>
+                </a:extLst>
+              </p:cNvPr>
+              <p:cNvSpPr txBox="1">
+                <a:spLocks noRot="1" noChangeAspect="1" noMove="1" noResize="1" noEditPoints="1" noAdjustHandles="1" noChangeArrowheads="1" noChangeShapeType="1" noTextEdit="1"/>
+              </p:cNvSpPr>
+              <p:nvPr/>
+            </p:nvSpPr>
+            <p:spPr>
+              <a:xfrm>
+                <a:off x="3211830" y="3141307"/>
+                <a:ext cx="658835" cy="276999"/>
+              </a:xfrm>
+              <a:prstGeom prst="rect">
+                <a:avLst/>
+              </a:prstGeom>
+              <a:blipFill>
+                <a:blip r:embed="rId3"/>
+                <a:stretch>
+                  <a:fillRect l="-1887" r="-5660" b="-4348"/>
+                </a:stretch>
+              </a:blipFill>
+            </p:spPr>
+            <p:txBody>
+              <a:bodyPr/>
+              <a:lstStyle/>
+              <a:p>
+                <a:r>
+                  <a:rPr lang="en-US">
+                    <a:noFill/>
+                  </a:rPr>
+                  <a:t> </a:t>
+                </a:r>
+              </a:p>
+            </p:txBody>
+          </p:sp>
+        </mc:Fallback>
+      </mc:AlternateContent>
+      <mc:AlternateContent xmlns:mc="http://schemas.openxmlformats.org/markup-compatibility/2006">
+        <mc:Choice xmlns:a14="http://schemas.microsoft.com/office/drawing/2010/main" Requires="a14">
+          <p:sp>
+            <p:nvSpPr>
+              <p:cNvPr id="67" name="文本框 66">
+                <a:extLst>
+                  <a:ext uri="{FF2B5EF4-FFF2-40B4-BE49-F238E27FC236}">
+                    <a16:creationId xmlns:a16="http://schemas.microsoft.com/office/drawing/2014/main" id="{68C2D284-C952-412B-BB97-31757B095A8E}"/>
+                  </a:ext>
+                </a:extLst>
+              </p:cNvPr>
+              <p:cNvSpPr txBox="1"/>
+              <p:nvPr/>
+            </p:nvSpPr>
+            <p:spPr>
+              <a:xfrm>
+                <a:off x="3885904" y="3141307"/>
+                <a:ext cx="658835" cy="276999"/>
+              </a:xfrm>
+              <a:prstGeom prst="rect">
+                <a:avLst/>
+              </a:prstGeom>
+              <a:noFill/>
+            </p:spPr>
+            <p:txBody>
+              <a:bodyPr wrap="none" lIns="0" tIns="0" rIns="0" bIns="0" rtlCol="0">
+                <a:spAutoFit/>
+              </a:bodyPr>
+              <a:lstStyle/>
+              <a:p>
+                <a:pPr/>
                 <a14:m>
                   <m:oMathPara xmlns:m="http://schemas.openxmlformats.org/officeDocument/2006/math">
                     <m:oMathParaPr>
@@ -4385,122 +4507,6 @@
         <mc:Fallback>
           <p:sp>
             <p:nvSpPr>
-              <p:cNvPr id="66" name="文本框 65">
-                <a:extLst>
-                  <a:ext uri="{FF2B5EF4-FFF2-40B4-BE49-F238E27FC236}">
-                    <a16:creationId xmlns:a16="http://schemas.microsoft.com/office/drawing/2014/main" id="{E5245C6F-8A82-4FA4-AC7E-3D4BD0B9225A}"/>
-                  </a:ext>
-                </a:extLst>
-              </p:cNvPr>
-              <p:cNvSpPr txBox="1">
-                <a:spLocks noRot="1" noChangeAspect="1" noMove="1" noResize="1" noEditPoints="1" noAdjustHandles="1" noChangeArrowheads="1" noChangeShapeType="1" noTextEdit="1"/>
-              </p:cNvSpPr>
-              <p:nvPr/>
-            </p:nvSpPr>
-            <p:spPr>
-              <a:xfrm>
-                <a:off x="3211830" y="3141307"/>
-                <a:ext cx="658835" cy="276999"/>
-              </a:xfrm>
-              <a:prstGeom prst="rect">
-                <a:avLst/>
-              </a:prstGeom>
-              <a:blipFill>
-                <a:blip r:embed="rId3"/>
-                <a:stretch>
-                  <a:fillRect l="-3704" r="-7407" b="-6522"/>
-                </a:stretch>
-              </a:blipFill>
-            </p:spPr>
-            <p:txBody>
-              <a:bodyPr/>
-              <a:lstStyle/>
-              <a:p>
-                <a:r>
-                  <a:rPr lang="zh-CN" altLang="en-US">
-                    <a:noFill/>
-                  </a:rPr>
-                  <a:t> </a:t>
-                </a:r>
-              </a:p>
-            </p:txBody>
-          </p:sp>
-        </mc:Fallback>
-      </mc:AlternateContent>
-      <mc:AlternateContent xmlns:mc="http://schemas.openxmlformats.org/markup-compatibility/2006">
-        <mc:Choice xmlns:a14="http://schemas.microsoft.com/office/drawing/2010/main" Requires="a14">
-          <p:sp>
-            <p:nvSpPr>
-              <p:cNvPr id="67" name="文本框 66">
-                <a:extLst>
-                  <a:ext uri="{FF2B5EF4-FFF2-40B4-BE49-F238E27FC236}">
-                    <a16:creationId xmlns:a16="http://schemas.microsoft.com/office/drawing/2014/main" id="{68C2D284-C952-412B-BB97-31757B095A8E}"/>
-                  </a:ext>
-                </a:extLst>
-              </p:cNvPr>
-              <p:cNvSpPr txBox="1"/>
-              <p:nvPr/>
-            </p:nvSpPr>
-            <p:spPr>
-              <a:xfrm>
-                <a:off x="3885904" y="3141307"/>
-                <a:ext cx="658835" cy="276999"/>
-              </a:xfrm>
-              <a:prstGeom prst="rect">
-                <a:avLst/>
-              </a:prstGeom>
-              <a:noFill/>
-            </p:spPr>
-            <p:txBody>
-              <a:bodyPr wrap="none" lIns="0" tIns="0" rIns="0" bIns="0" rtlCol="0">
-                <a:spAutoFit/>
-              </a:bodyPr>
-              <a:lstStyle/>
-              <a:p>
-                <a14:m>
-                  <m:oMathPara xmlns:m="http://schemas.openxmlformats.org/officeDocument/2006/math">
-                    <m:oMathParaPr>
-                      <m:jc m:val="centerGroup"/>
-                    </m:oMathParaPr>
-                    <m:oMath xmlns:m="http://schemas.openxmlformats.org/officeDocument/2006/math">
-                      <m:r>
-                        <a:rPr lang="en-US" altLang="zh-CN" b="1" i="1" smtClean="0">
-                          <a:solidFill>
-                            <a:srgbClr val="7030A0"/>
-                          </a:solidFill>
-                          <a:latin typeface="Cambria Math" panose="02040503050406030204" pitchFamily="18" charset="0"/>
-                        </a:rPr>
-                        <m:t>𝜶</m:t>
-                      </m:r>
-                      <m:r>
-                        <a:rPr lang="en-US" altLang="zh-CN" b="1" i="1" smtClean="0">
-                          <a:solidFill>
-                            <a:srgbClr val="7030A0"/>
-                          </a:solidFill>
-                          <a:latin typeface="Cambria Math" panose="02040503050406030204" pitchFamily="18" charset="0"/>
-                        </a:rPr>
-                        <m:t>&lt;</m:t>
-                      </m:r>
-                      <m:r>
-                        <a:rPr lang="en-US" altLang="zh-CN" b="1" i="1" smtClean="0">
-                          <a:solidFill>
-                            <a:srgbClr val="7030A0"/>
-                          </a:solidFill>
-                          <a:latin typeface="Cambria Math" panose="02040503050406030204" pitchFamily="18" charset="0"/>
-                        </a:rPr>
-                        <m:t>𝟎</m:t>
-                      </m:r>
-                    </m:oMath>
-                  </m:oMathPara>
-                </a14:m>
-                <a:endParaRPr lang="zh-CN" altLang="en-US" b="1" dirty="0"/>
-              </a:p>
-            </p:txBody>
-          </p:sp>
-        </mc:Choice>
-        <mc:Fallback>
-          <p:sp>
-            <p:nvSpPr>
               <p:cNvPr id="67" name="文本框 66">
                 <a:extLst>
                   <a:ext uri="{FF2B5EF4-FFF2-40B4-BE49-F238E27FC236}">
@@ -4524,7 +4530,7 @@
               <a:blipFill>
                 <a:blip r:embed="rId4"/>
                 <a:stretch>
-                  <a:fillRect l="-3670" r="-7339" b="-6522"/>
+                  <a:fillRect l="-3774" r="-5660" b="-4348"/>
                 </a:stretch>
               </a:blipFill>
             </p:spPr>
@@ -4533,7 +4539,7 @@
               <a:lstStyle/>
               <a:p>
                 <a:r>
-                  <a:rPr lang="zh-CN" altLang="en-US">
+                  <a:rPr lang="en-US">
                     <a:noFill/>
                   </a:rPr>
                   <a:t> </a:t>
@@ -4559,8 +4565,8 @@
             </p:nvSpPr>
             <p:spPr>
               <a:xfrm>
-                <a:off x="3799478" y="2829413"/>
-                <a:ext cx="2492656" cy="288733"/>
+                <a:off x="3911520" y="2588733"/>
+                <a:ext cx="3199839" cy="577466"/>
               </a:xfrm>
               <a:prstGeom prst="rect">
                 <a:avLst/>
@@ -4582,108 +4588,74 @@
                       <m:sSub>
                         <m:sSubPr>
                           <m:ctrlPr>
-                            <a:rPr lang="en-US" altLang="zh-CN" b="0" i="1" smtClean="0">
-                              <a:latin typeface="Cambria Math" panose="02040503050406030204" pitchFamily="18" charset="0"/>
-                            </a:rPr>
+                            <a:rPr lang="en-US" i="1"/>
                           </m:ctrlPr>
                         </m:sSubPr>
                         <m:e>
                           <m:r>
-                            <a:rPr lang="en-US" altLang="zh-CN" b="0" i="1" smtClean="0">
-                              <a:latin typeface="Cambria Math" panose="02040503050406030204" pitchFamily="18" charset="0"/>
-                            </a:rPr>
+                            <a:rPr lang="en-US" i="1"/>
                             <m:t>𝜃</m:t>
                           </m:r>
                         </m:e>
                         <m:sub>
                           <m:r>
-                            <a:rPr lang="en-US" altLang="zh-CN" b="0" i="1" smtClean="0">
-                              <a:latin typeface="Cambria Math" panose="02040503050406030204" pitchFamily="18" charset="0"/>
-                            </a:rPr>
+                            <a:rPr lang="en-US" i="1"/>
                             <m:t>𝑡</m:t>
                           </m:r>
                         </m:sub>
                       </m:sSub>
                       <m:r>
-                        <a:rPr lang="en-US" altLang="zh-CN" b="1" i="1" smtClean="0">
-                          <a:solidFill>
-                            <a:schemeClr val="tx1"/>
-                          </a:solidFill>
-                          <a:latin typeface="Cambria Math" panose="02040503050406030204" pitchFamily="18" charset="0"/>
-                        </a:rPr>
+                        <m:rPr>
+                          <m:aln/>
+                        </m:rPr>
+                        <a:rPr lang="en-US" b="1" i="1"/>
                         <m:t>=</m:t>
                       </m:r>
                       <m:r>
-                        <a:rPr lang="en-US" altLang="zh-CN" i="1">
-                          <a:solidFill>
-                            <a:srgbClr val="000000"/>
-                          </a:solidFill>
-                          <a:latin typeface="Cambria Math" panose="02040503050406030204" pitchFamily="18" charset="0"/>
-                          <a:cs typeface="Times New Roman" panose="02020603050405020304" pitchFamily="18" charset="0"/>
-                        </a:rPr>
+                        <a:rPr lang="en-US" i="1"/>
                         <m:t>𝑉</m:t>
                       </m:r>
+                      <m:d>
+                        <m:dPr>
+                          <m:ctrlPr>
+                            <a:rPr lang="en-US" i="1"/>
+                          </m:ctrlPr>
+                        </m:dPr>
+                        <m:e>
+                          <m:r>
+                            <a:rPr lang="en-US" i="1"/>
+                            <m:t>1</m:t>
+                          </m:r>
+                          <m:r>
+                            <a:rPr lang="en-US" b="1" i="1"/>
+                            <m:t>−</m:t>
+                          </m:r>
+                          <m:r>
+                            <a:rPr lang="en-US" b="1" i="1" smtClean="0">
+                              <a:solidFill>
+                                <a:srgbClr val="7030A0"/>
+                              </a:solidFill>
+                            </a:rPr>
+                            <m:t>𝜶</m:t>
+                          </m:r>
+                        </m:e>
+                      </m:d>
                       <m:r>
-                        <a:rPr lang="en-US" altLang="zh-CN" i="1">
-                          <a:solidFill>
-                            <a:srgbClr val="000000"/>
-                          </a:solidFill>
-                          <a:latin typeface="Cambria Math" panose="02040503050406030204" pitchFamily="18" charset="0"/>
-                          <a:cs typeface="Times New Roman" panose="02020603050405020304" pitchFamily="18" charset="0"/>
-                        </a:rPr>
-                        <m:t>(1+</m:t>
+                        <a:rPr lang="en-US" i="1"/>
+                        <m:t>+</m:t>
                       </m:r>
                       <m:r>
-                        <a:rPr lang="en-US" altLang="zh-CN" b="1" i="1" smtClean="0">
+                        <a:rPr lang="en-US" b="1" i="1" smtClean="0">
                           <a:solidFill>
                             <a:srgbClr val="7030A0"/>
                           </a:solidFill>
-                          <a:latin typeface="Cambria Math" panose="02040503050406030204" pitchFamily="18" charset="0"/>
-                          <a:cs typeface="Times New Roman" panose="02020603050405020304" pitchFamily="18" charset="0"/>
-                        </a:rPr>
-                        <m:t>𝜶</m:t>
-                      </m:r>
-                      <m:r>
-                        <a:rPr lang="en-US" altLang="zh-CN" i="1">
-                          <a:solidFill>
-                            <a:srgbClr val="000000"/>
-                          </a:solidFill>
-                          <a:latin typeface="Cambria Math" panose="02040503050406030204" pitchFamily="18" charset="0"/>
-                          <a:cs typeface="Times New Roman" panose="02020603050405020304" pitchFamily="18" charset="0"/>
-                        </a:rPr>
-                        <m:t>)</m:t>
-                      </m:r>
-                      <m:r>
-                        <a:rPr lang="en-US" altLang="zh-CN" i="1">
-                          <a:solidFill>
-                            <a:srgbClr val="000000"/>
-                          </a:solidFill>
-                          <a:latin typeface="Cambria Math" panose="02040503050406030204" pitchFamily="18" charset="0"/>
-                          <a:cs typeface="Times New Roman" panose="02020603050405020304" pitchFamily="18" charset="0"/>
-                        </a:rPr>
-                        <m:t>−</m:t>
-                      </m:r>
-                      <m:r>
-                        <a:rPr lang="en-US" altLang="zh-CN" b="1" i="1" smtClean="0">
-                          <a:solidFill>
-                            <a:srgbClr val="7030A0"/>
-                          </a:solidFill>
-                          <a:latin typeface="Cambria Math" panose="02040503050406030204" pitchFamily="18" charset="0"/>
-                          <a:cs typeface="Times New Roman" panose="02020603050405020304" pitchFamily="18" charset="0"/>
                         </a:rPr>
                         <m:t>𝜶</m:t>
                       </m:r>
                       <m:sSub>
                         <m:sSubPr>
                           <m:ctrlPr>
-                            <a:rPr lang="zh-CN" altLang="zh-CN" i="1">
-                              <a:solidFill>
-                                <a:srgbClr val="000000"/>
-                              </a:solidFill>
-                              <a:latin typeface="Cambria Math" panose="02040503050406030204" pitchFamily="18" charset="0"/>
-                              <a:ea typeface="Cambria Math" panose="02040503050406030204" pitchFamily="18" charset="0"/>
-                              <a:cs typeface="Times New Roman" panose="02020603050405020304" pitchFamily="18" charset="0"/>
-                            </a:rPr>
+                            <a:rPr lang="en-US" i="1"/>
                           </m:ctrlPr>
                         </m:sSubPr>
                         <m:e>
@@ -4691,25 +4663,12 @@
                             <m:accPr>
                               <m:chr m:val="̂"/>
                               <m:ctrlPr>
-                                <a:rPr lang="zh-CN" altLang="zh-CN" i="1">
-                                  <a:solidFill>
-                                    <a:srgbClr val="000000"/>
-                                  </a:solidFill>
-                                  <a:latin typeface="Cambria Math" panose="02040503050406030204" pitchFamily="18" charset="0"/>
-                                  <a:ea typeface="Cambria Math" panose="02040503050406030204" pitchFamily="18" charset="0"/>
-                                  <a:cs typeface="Times New Roman" panose="02020603050405020304" pitchFamily="18" charset="0"/>
-                                </a:rPr>
+                                <a:rPr lang="en-US" i="1"/>
                               </m:ctrlPr>
                             </m:accPr>
                             <m:e>
                               <m:r>
-                                <a:rPr lang="en-US" altLang="zh-CN" i="1">
-                                  <a:solidFill>
-                                    <a:srgbClr val="000000"/>
-                                  </a:solidFill>
-                                  <a:latin typeface="Cambria Math" panose="02040503050406030204" pitchFamily="18" charset="0"/>
-                                  <a:cs typeface="Times New Roman" panose="02020603050405020304" pitchFamily="18" charset="0"/>
-                                </a:rPr>
+                                <a:rPr lang="en-US" i="1"/>
                                 <m:t>𝜃</m:t>
                               </m:r>
                             </m:e>
@@ -4717,25 +4676,134 @@
                         </m:e>
                         <m:sub>
                           <m:r>
-                            <a:rPr lang="en-US" altLang="zh-CN" i="1">
-                              <a:solidFill>
-                                <a:srgbClr val="000000"/>
-                              </a:solidFill>
-                              <a:latin typeface="Cambria Math" panose="02040503050406030204" pitchFamily="18" charset="0"/>
-                              <a:cs typeface="Times New Roman" panose="02020603050405020304" pitchFamily="18" charset="0"/>
-                            </a:rPr>
+                            <a:rPr lang="en-US" i="1"/>
                             <m:t>𝑡</m:t>
                           </m:r>
                         </m:sub>
                       </m:sSub>
                     </m:oMath>
+                    <m:oMath xmlns:m="http://schemas.openxmlformats.org/officeDocument/2006/math">
+                      <m:r>
+                        <m:rPr>
+                          <m:aln/>
+                        </m:rPr>
+                        <a:rPr lang="en-US" i="1"/>
+                        <m:t>=</m:t>
+                      </m:r>
+                      <m:sSub>
+                        <m:sSubPr>
+                          <m:ctrlPr>
+                            <a:rPr lang="en-US" i="1"/>
+                          </m:ctrlPr>
+                        </m:sSubPr>
+                        <m:e>
+                          <m:acc>
+                            <m:accPr>
+                              <m:chr m:val="̂"/>
+                              <m:ctrlPr>
+                                <a:rPr lang="en-US" i="1"/>
+                              </m:ctrlPr>
+                            </m:accPr>
+                            <m:e>
+                              <m:r>
+                                <a:rPr lang="en-US" i="1"/>
+                                <m:t>𝜃</m:t>
+                              </m:r>
+                            </m:e>
+                          </m:acc>
+                        </m:e>
+                        <m:sub>
+                          <m:r>
+                            <a:rPr lang="en-US" i="1"/>
+                            <m:t>𝑡</m:t>
+                          </m:r>
+                        </m:sub>
+                      </m:sSub>
+                      <m:r>
+                        <a:rPr lang="en-US" b="1"/>
+                        <m:t>+</m:t>
+                      </m:r>
+                      <m:d>
+                        <m:dPr>
+                          <m:ctrlPr>
+                            <a:rPr lang="en-US" i="1">
+                              <a:latin typeface="Cambria Math" panose="02040503050406030204" pitchFamily="18" charset="0"/>
+                            </a:rPr>
+                          </m:ctrlPr>
+                        </m:dPr>
+                        <m:e>
+                          <m:r>
+                            <a:rPr lang="en-US" i="1">
+                              <a:latin typeface="Cambria Math" panose="02040503050406030204" pitchFamily="18" charset="0"/>
+                            </a:rPr>
+                            <m:t>1</m:t>
+                          </m:r>
+                          <m:r>
+                            <a:rPr lang="en-US" b="1" i="1">
+                              <a:latin typeface="Cambria Math" panose="02040503050406030204" pitchFamily="18" charset="0"/>
+                            </a:rPr>
+                            <m:t>−</m:t>
+                          </m:r>
+                          <m:r>
+                            <a:rPr lang="en-US" b="1" i="1">
+                              <a:solidFill>
+                                <a:srgbClr val="7030A0"/>
+                              </a:solidFill>
+                              <a:latin typeface="Cambria Math" panose="02040503050406030204" pitchFamily="18" charset="0"/>
+                            </a:rPr>
+                            <m:t>𝜶</m:t>
+                          </m:r>
+                        </m:e>
+                      </m:d>
+                      <m:r>
+                        <a:rPr lang="en-US" i="1"/>
+                        <m:t>(</m:t>
+                      </m:r>
+                      <m:r>
+                        <a:rPr lang="en-US" i="1"/>
+                        <m:t>𝑉</m:t>
+                      </m:r>
+                      <m:r>
+                        <a:rPr lang="en-US" i="1"/>
+                        <m:t>−</m:t>
+                      </m:r>
+                      <m:sSub>
+                        <m:sSubPr>
+                          <m:ctrlPr>
+                            <a:rPr lang="en-US" i="1"/>
+                          </m:ctrlPr>
+                        </m:sSubPr>
+                        <m:e>
+                          <m:acc>
+                            <m:accPr>
+                              <m:chr m:val="̂"/>
+                              <m:ctrlPr>
+                                <a:rPr lang="en-US" i="1"/>
+                              </m:ctrlPr>
+                            </m:accPr>
+                            <m:e>
+                              <m:r>
+                                <a:rPr lang="en-US" i="1"/>
+                                <m:t>𝜃</m:t>
+                              </m:r>
+                            </m:e>
+                          </m:acc>
+                        </m:e>
+                        <m:sub>
+                          <m:r>
+                            <a:rPr lang="en-US" i="1"/>
+                            <m:t>𝑡</m:t>
+                          </m:r>
+                        </m:sub>
+                      </m:sSub>
+                      <m:r>
+                        <a:rPr lang="en-US" i="1"/>
+                        <m:t>)</m:t>
+                      </m:r>
+                    </m:oMath>
                   </m:oMathPara>
                 </a14:m>
-                <a:endParaRPr lang="zh-CN" altLang="en-US" b="1" dirty="0">
-                  <a:solidFill>
-                    <a:srgbClr val="7030A0"/>
-                  </a:solidFill>
-                </a:endParaRPr>
+                <a:endParaRPr lang="en-US" dirty="0"/>
               </a:p>
             </p:txBody>
           </p:sp>
@@ -4757,8 +4825,8 @@
             </p:nvSpPr>
             <p:spPr>
               <a:xfrm>
-                <a:off x="3799478" y="2829413"/>
-                <a:ext cx="2492656" cy="288733"/>
+                <a:off x="3911520" y="2588733"/>
+                <a:ext cx="3199839" cy="577466"/>
               </a:xfrm>
               <a:prstGeom prst="rect">
                 <a:avLst/>
@@ -4766,7 +4834,7 @@
               <a:blipFill>
                 <a:blip r:embed="rId5"/>
                 <a:stretch>
-                  <a:fillRect t="-25000" b="-31250"/>
+                  <a:fillRect t="-13333" b="-15556"/>
                 </a:stretch>
               </a:blipFill>
             </p:spPr>
@@ -4775,7 +4843,7 @@
               <a:lstStyle/>
               <a:p>
                 <a:r>
-                  <a:rPr lang="zh-CN" altLang="en-US">
+                  <a:rPr lang="en-US">
                     <a:noFill/>
                   </a:rPr>
                   <a:t> </a:t>
@@ -4814,6 +4882,7 @@
               </a:bodyPr>
               <a:lstStyle/>
               <a:p>
+                <a:pPr/>
                 <a14:m>
                   <m:oMathPara xmlns:m="http://schemas.openxmlformats.org/officeDocument/2006/math">
                     <m:oMathParaPr>
@@ -4906,8 +4975,9 @@
                             <a:schemeClr val="accent5"/>
                           </a:solidFill>
                           <a:latin typeface="Cambria Math" panose="02040503050406030204" pitchFamily="18" charset="0"/>
+                          <a:ea typeface="Cambria Math" panose="02040503050406030204" pitchFamily="18" charset="0"/>
                         </a:rPr>
-                        <m:t>𝒍𝒓</m:t>
+                        <m:t>𝝀</m:t>
                       </m:r>
                       <m:f>
                         <m:fPr>
@@ -5052,7 +5122,7 @@
               <a:lstStyle/>
               <a:p>
                 <a:r>
-                  <a:rPr lang="zh-CN" altLang="en-US">
+                  <a:rPr lang="en-US">
                     <a:noFill/>
                   </a:rPr>
                   <a:t> </a:t>
@@ -5303,8 +5373,8 @@
             </p:nvSpPr>
             <p:spPr>
               <a:xfrm>
-                <a:off x="3751150" y="363322"/>
-                <a:ext cx="4402417" cy="1176669"/>
+                <a:off x="4064789" y="409642"/>
+                <a:ext cx="4402417" cy="991938"/>
               </a:xfrm>
               <a:prstGeom prst="rect">
                 <a:avLst/>
@@ -5323,326 +5393,486 @@
                   </a:spcAft>
                 </a:pPr>
                 <a14:m>
+                  <m:oMath xmlns:m="http://schemas.openxmlformats.org/officeDocument/2006/math">
+                    <m:sSub>
+                      <m:sSubPr>
+                        <m:ctrlPr>
+                          <a:rPr lang="zh-CN" sz="1800" i="1" kern="1200" smtClean="0">
+                            <a:solidFill>
+                              <a:srgbClr val="000000"/>
+                            </a:solidFill>
+                            <a:effectLst/>
+                            <a:latin typeface="Cambria Math" panose="02040503050406030204" pitchFamily="18" charset="0"/>
+                            <a:ea typeface="Cambria Math" panose="02040503050406030204" pitchFamily="18" charset="0"/>
+                            <a:cs typeface="Times New Roman" panose="02020603050405020304" pitchFamily="18" charset="0"/>
+                          </a:rPr>
+                        </m:ctrlPr>
+                      </m:sSubPr>
+                      <m:e>
+                        <m:r>
+                          <a:rPr lang="en-US" sz="1800" i="1" kern="1200">
+                            <a:solidFill>
+                              <a:srgbClr val="000000"/>
+                            </a:solidFill>
+                            <a:effectLst/>
+                            <a:latin typeface="Cambria Math" panose="02040503050406030204" pitchFamily="18" charset="0"/>
+                            <a:ea typeface="等线" panose="02010600030101010101" pitchFamily="2" charset="-122"/>
+                            <a:cs typeface="Times New Roman" panose="02020603050405020304" pitchFamily="18" charset="0"/>
+                          </a:rPr>
+                          <m:t>𝜃</m:t>
+                        </m:r>
+                      </m:e>
+                      <m:sub>
+                        <m:r>
+                          <a:rPr lang="en-US" sz="1800" i="1" kern="1200">
+                            <a:solidFill>
+                              <a:srgbClr val="000000"/>
+                            </a:solidFill>
+                            <a:effectLst/>
+                            <a:latin typeface="Cambria Math" panose="02040503050406030204" pitchFamily="18" charset="0"/>
+                            <a:ea typeface="等线" panose="02010600030101010101" pitchFamily="2" charset="-122"/>
+                            <a:cs typeface="Times New Roman" panose="02020603050405020304" pitchFamily="18" charset="0"/>
+                          </a:rPr>
+                          <m:t>𝑡</m:t>
+                        </m:r>
+                      </m:sub>
+                    </m:sSub>
+                    <m:r>
+                      <m:rPr>
+                        <m:aln/>
+                      </m:rPr>
+                      <a:rPr lang="en-US" sz="1800" i="1" kern="1200">
+                        <a:solidFill>
+                          <a:srgbClr val="000000"/>
+                        </a:solidFill>
+                        <a:effectLst/>
+                        <a:latin typeface="Cambria Math" panose="02040503050406030204" pitchFamily="18" charset="0"/>
+                        <a:ea typeface="等线" panose="02010600030101010101" pitchFamily="2" charset="-122"/>
+                        <a:cs typeface="Times New Roman" panose="02020603050405020304" pitchFamily="18" charset="0"/>
+                      </a:rPr>
+                      <m:t>=</m:t>
+                    </m:r>
+                    <m:sSub>
+                      <m:sSubPr>
+                        <m:ctrlPr>
+                          <a:rPr lang="zh-CN" sz="1800" i="1" kern="1200">
+                            <a:solidFill>
+                              <a:srgbClr val="000000"/>
+                            </a:solidFill>
+                            <a:effectLst/>
+                            <a:latin typeface="Cambria Math" panose="02040503050406030204" pitchFamily="18" charset="0"/>
+                            <a:ea typeface="Cambria Math" panose="02040503050406030204" pitchFamily="18" charset="0"/>
+                            <a:cs typeface="Times New Roman" panose="02020603050405020304" pitchFamily="18" charset="0"/>
+                          </a:rPr>
+                        </m:ctrlPr>
+                      </m:sSubPr>
+                      <m:e>
+                        <m:r>
+                          <a:rPr lang="en-US" sz="1800" i="1" kern="1200">
+                            <a:solidFill>
+                              <a:srgbClr val="000000"/>
+                            </a:solidFill>
+                            <a:effectLst/>
+                            <a:latin typeface="Cambria Math" panose="02040503050406030204" pitchFamily="18" charset="0"/>
+                            <a:ea typeface="等线" panose="02010600030101010101" pitchFamily="2" charset="-122"/>
+                            <a:cs typeface="Times New Roman" panose="02020603050405020304" pitchFamily="18" charset="0"/>
+                          </a:rPr>
+                          <m:t>𝜃</m:t>
+                        </m:r>
+                      </m:e>
+                      <m:sub>
+                        <m:r>
+                          <a:rPr lang="en-US" sz="1800" i="1" kern="1200">
+                            <a:solidFill>
+                              <a:srgbClr val="000000"/>
+                            </a:solidFill>
+                            <a:effectLst/>
+                            <a:latin typeface="Cambria Math" panose="02040503050406030204" pitchFamily="18" charset="0"/>
+                            <a:ea typeface="等线" panose="02010600030101010101" pitchFamily="2" charset="-122"/>
+                            <a:cs typeface="Times New Roman" panose="02020603050405020304" pitchFamily="18" charset="0"/>
+                          </a:rPr>
+                          <m:t>𝑡</m:t>
+                        </m:r>
+                        <m:r>
+                          <a:rPr lang="en-US" sz="1800" i="1" kern="1200">
+                            <a:solidFill>
+                              <a:srgbClr val="000000"/>
+                            </a:solidFill>
+                            <a:effectLst/>
+                            <a:latin typeface="Cambria Math" panose="02040503050406030204" pitchFamily="18" charset="0"/>
+                            <a:ea typeface="等线" panose="02010600030101010101" pitchFamily="2" charset="-122"/>
+                            <a:cs typeface="Times New Roman" panose="02020603050405020304" pitchFamily="18" charset="0"/>
+                          </a:rPr>
+                          <m:t>−1</m:t>
+                        </m:r>
+                      </m:sub>
+                    </m:sSub>
+                    <m:r>
+                      <a:rPr lang="en-US" sz="1800" i="1" kern="1200">
+                        <a:solidFill>
+                          <a:srgbClr val="000000"/>
+                        </a:solidFill>
+                        <a:effectLst/>
+                        <a:latin typeface="Cambria Math" panose="02040503050406030204" pitchFamily="18" charset="0"/>
+                        <a:ea typeface="等线" panose="02010600030101010101" pitchFamily="2" charset="-122"/>
+                        <a:cs typeface="Times New Roman" panose="02020603050405020304" pitchFamily="18" charset="0"/>
+                      </a:rPr>
+                      <m:t>−</m:t>
+                    </m:r>
+                    <m:r>
+                      <a:rPr lang="en-US" sz="1800" b="1" i="1" kern="1200" smtClean="0">
+                        <a:solidFill>
+                          <a:srgbClr val="5B9BD5"/>
+                        </a:solidFill>
+                        <a:effectLst/>
+                        <a:latin typeface="Cambria Math" panose="02040503050406030204" pitchFamily="18" charset="0"/>
+                        <a:ea typeface="Cambria Math" panose="02040503050406030204" pitchFamily="18" charset="0"/>
+                        <a:cs typeface="Times New Roman" panose="02020603050405020304" pitchFamily="18" charset="0"/>
+                      </a:rPr>
+                      <m:t>𝝀</m:t>
+                    </m:r>
+                    <m:f>
+                      <m:fPr>
+                        <m:ctrlPr>
+                          <a:rPr lang="zh-CN" sz="1800" b="1" i="1" kern="1200">
+                            <a:solidFill>
+                              <a:srgbClr val="5B9BD5"/>
+                            </a:solidFill>
+                            <a:effectLst/>
+                            <a:latin typeface="Cambria Math" panose="02040503050406030204" pitchFamily="18" charset="0"/>
+                            <a:ea typeface="Cambria Math" panose="02040503050406030204" pitchFamily="18" charset="0"/>
+                            <a:cs typeface="Times New Roman" panose="02020603050405020304" pitchFamily="18" charset="0"/>
+                          </a:rPr>
+                        </m:ctrlPr>
+                      </m:fPr>
+                      <m:num>
+                        <m:sSub>
+                          <m:sSubPr>
+                            <m:ctrlPr>
+                              <a:rPr lang="zh-CN" sz="1800" b="1" i="1" kern="1200">
+                                <a:solidFill>
+                                  <a:srgbClr val="5B9BD5"/>
+                                </a:solidFill>
+                                <a:effectLst/>
+                                <a:latin typeface="Cambria Math" panose="02040503050406030204" pitchFamily="18" charset="0"/>
+                                <a:ea typeface="Cambria Math" panose="02040503050406030204" pitchFamily="18" charset="0"/>
+                                <a:cs typeface="Times New Roman" panose="02020603050405020304" pitchFamily="18" charset="0"/>
+                              </a:rPr>
+                            </m:ctrlPr>
+                          </m:sSubPr>
+                          <m:e>
+                            <m:r>
+                              <a:rPr lang="en-US" b="1" i="1">
+                                <a:solidFill>
+                                  <a:srgbClr val="7030A0"/>
+                                </a:solidFill>
+                                <a:latin typeface="Cambria Math" panose="02040503050406030204" pitchFamily="18" charset="0"/>
+                                <a:ea typeface="等线" panose="02010600030101010101" pitchFamily="2" charset="-122"/>
+                                <a:cs typeface="Times New Roman" panose="02020603050405020304" pitchFamily="18" charset="0"/>
+                              </a:rPr>
+                              <m:t>𝜶</m:t>
+                            </m:r>
+                            <m:r>
+                              <a:rPr lang="en-US" sz="1800" b="1" i="1" kern="1200">
+                                <a:solidFill>
+                                  <a:srgbClr val="5B9BD5"/>
+                                </a:solidFill>
+                                <a:effectLst/>
+                                <a:latin typeface="Cambria Math" panose="02040503050406030204" pitchFamily="18" charset="0"/>
+                                <a:ea typeface="等线" panose="02010600030101010101" pitchFamily="2" charset="-122"/>
+                                <a:cs typeface="Times New Roman" panose="02020603050405020304" pitchFamily="18" charset="0"/>
+                              </a:rPr>
+                              <m:t>𝒎</m:t>
+                            </m:r>
+                          </m:e>
+                          <m:sub>
+                            <m:r>
+                              <a:rPr lang="en-US" sz="1800" b="1" i="1" kern="1200">
+                                <a:solidFill>
+                                  <a:srgbClr val="5B9BD5"/>
+                                </a:solidFill>
+                                <a:effectLst/>
+                                <a:latin typeface="Cambria Math" panose="02040503050406030204" pitchFamily="18" charset="0"/>
+                                <a:ea typeface="等线" panose="02010600030101010101" pitchFamily="2" charset="-122"/>
+                                <a:cs typeface="Times New Roman" panose="02020603050405020304" pitchFamily="18" charset="0"/>
+                              </a:rPr>
+                              <m:t>𝒕</m:t>
+                            </m:r>
+                          </m:sub>
+                        </m:sSub>
+                      </m:num>
+                      <m:den>
+                        <m:rad>
+                          <m:radPr>
+                            <m:degHide m:val="on"/>
+                            <m:ctrlPr>
+                              <a:rPr lang="zh-CN" sz="1800" b="1" i="1" kern="1200">
+                                <a:solidFill>
+                                  <a:srgbClr val="5B9BD5"/>
+                                </a:solidFill>
+                                <a:effectLst/>
+                                <a:latin typeface="Cambria Math" panose="02040503050406030204" pitchFamily="18" charset="0"/>
+                                <a:ea typeface="Cambria Math" panose="02040503050406030204" pitchFamily="18" charset="0"/>
+                                <a:cs typeface="Times New Roman" panose="02020603050405020304" pitchFamily="18" charset="0"/>
+                              </a:rPr>
+                            </m:ctrlPr>
+                          </m:radPr>
+                          <m:deg/>
+                          <m:e>
+                            <m:sSub>
+                              <m:sSubPr>
+                                <m:ctrlPr>
+                                  <a:rPr lang="zh-CN" sz="1800" b="1" i="1" kern="1200">
+                                    <a:solidFill>
+                                      <a:srgbClr val="5B9BD5"/>
+                                    </a:solidFill>
+                                    <a:effectLst/>
+                                    <a:latin typeface="Cambria Math" panose="02040503050406030204" pitchFamily="18" charset="0"/>
+                                    <a:ea typeface="Cambria Math" panose="02040503050406030204" pitchFamily="18" charset="0"/>
+                                    <a:cs typeface="Times New Roman" panose="02020603050405020304" pitchFamily="18" charset="0"/>
+                                  </a:rPr>
+                                </m:ctrlPr>
+                              </m:sSubPr>
+                              <m:e>
+                                <m:r>
+                                  <a:rPr lang="en-US" sz="1800" b="1" i="1" kern="1200">
+                                    <a:solidFill>
+                                      <a:srgbClr val="5B9BD5"/>
+                                    </a:solidFill>
+                                    <a:effectLst/>
+                                    <a:latin typeface="Cambria Math" panose="02040503050406030204" pitchFamily="18" charset="0"/>
+                                    <a:ea typeface="等线" panose="02010600030101010101" pitchFamily="2" charset="-122"/>
+                                    <a:cs typeface="Times New Roman" panose="02020603050405020304" pitchFamily="18" charset="0"/>
+                                  </a:rPr>
+                                  <m:t>𝒗</m:t>
+                                </m:r>
+                              </m:e>
+                              <m:sub>
+                                <m:r>
+                                  <a:rPr lang="en-US" sz="1800" b="1" i="1" kern="1200">
+                                    <a:solidFill>
+                                      <a:srgbClr val="5B9BD5"/>
+                                    </a:solidFill>
+                                    <a:effectLst/>
+                                    <a:latin typeface="Cambria Math" panose="02040503050406030204" pitchFamily="18" charset="0"/>
+                                    <a:ea typeface="等线" panose="02010600030101010101" pitchFamily="2" charset="-122"/>
+                                    <a:cs typeface="Times New Roman" panose="02020603050405020304" pitchFamily="18" charset="0"/>
+                                  </a:rPr>
+                                  <m:t>𝒕</m:t>
+                                </m:r>
+                              </m:sub>
+                            </m:sSub>
+                          </m:e>
+                        </m:rad>
+                      </m:den>
+                    </m:f>
+                    <m:r>
+                      <a:rPr lang="en-US" sz="1800" b="1" i="1" kern="1200" smtClean="0">
+                        <a:solidFill>
+                          <a:schemeClr val="tx1"/>
+                        </a:solidFill>
+                        <a:effectLst/>
+                        <a:latin typeface="Cambria Math" panose="02040503050406030204" pitchFamily="18" charset="0"/>
+                        <a:ea typeface="等线" panose="02010600030101010101" pitchFamily="2" charset="-122"/>
+                        <a:cs typeface="Times New Roman" panose="02020603050405020304" pitchFamily="18" charset="0"/>
+                      </a:rPr>
+                      <m:t>=</m:t>
+                    </m:r>
+                  </m:oMath>
+                </a14:m>
+                <a:r>
+                  <a:rPr lang="zh-CN" altLang="en-US" dirty="0">
+                    <a:solidFill>
+                      <a:srgbClr val="000000"/>
+                    </a:solidFill>
+                    <a:ea typeface="Cambria Math" panose="02040503050406030204" pitchFamily="18" charset="0"/>
+                    <a:cs typeface="Times New Roman" panose="02020603050405020304" pitchFamily="18" charset="0"/>
+                  </a:rPr>
+                  <a:t> </a:t>
+                </a:r>
+                <a14:m>
+                  <m:oMath xmlns:m="http://schemas.openxmlformats.org/officeDocument/2006/math">
+                    <m:sSub>
+                      <m:sSubPr>
+                        <m:ctrlPr>
+                          <a:rPr lang="zh-CN" altLang="en-US" i="1">
+                            <a:solidFill>
+                              <a:srgbClr val="000000"/>
+                            </a:solidFill>
+                            <a:latin typeface="Cambria Math" panose="02040503050406030204" pitchFamily="18" charset="0"/>
+                            <a:ea typeface="Cambria Math" panose="02040503050406030204" pitchFamily="18" charset="0"/>
+                            <a:cs typeface="Times New Roman" panose="02020603050405020304" pitchFamily="18" charset="0"/>
+                          </a:rPr>
+                        </m:ctrlPr>
+                      </m:sSubPr>
+                      <m:e>
+                        <m:r>
+                          <a:rPr lang="en-US" i="1">
+                            <a:solidFill>
+                              <a:srgbClr val="000000"/>
+                            </a:solidFill>
+                            <a:latin typeface="Cambria Math" panose="02040503050406030204" pitchFamily="18" charset="0"/>
+                            <a:ea typeface="等线" panose="02010600030101010101" pitchFamily="2" charset="-122"/>
+                            <a:cs typeface="Times New Roman" panose="02020603050405020304" pitchFamily="18" charset="0"/>
+                          </a:rPr>
+                          <m:t>𝜃</m:t>
+                        </m:r>
+                      </m:e>
+                      <m:sub>
+                        <m:r>
+                          <a:rPr lang="en-US" i="1">
+                            <a:solidFill>
+                              <a:srgbClr val="000000"/>
+                            </a:solidFill>
+                            <a:latin typeface="Cambria Math" panose="02040503050406030204" pitchFamily="18" charset="0"/>
+                            <a:ea typeface="等线" panose="02010600030101010101" pitchFamily="2" charset="-122"/>
+                            <a:cs typeface="Times New Roman" panose="02020603050405020304" pitchFamily="18" charset="0"/>
+                          </a:rPr>
+                          <m:t>𝑡</m:t>
+                        </m:r>
+                        <m:r>
+                          <a:rPr lang="en-US" i="1">
+                            <a:solidFill>
+                              <a:srgbClr val="000000"/>
+                            </a:solidFill>
+                            <a:latin typeface="Cambria Math" panose="02040503050406030204" pitchFamily="18" charset="0"/>
+                            <a:ea typeface="等线" panose="02010600030101010101" pitchFamily="2" charset="-122"/>
+                            <a:cs typeface="Times New Roman" panose="02020603050405020304" pitchFamily="18" charset="0"/>
+                          </a:rPr>
+                          <m:t>−1</m:t>
+                        </m:r>
+                      </m:sub>
+                    </m:sSub>
+                    <m:r>
+                      <a:rPr lang="en-US" b="1" i="1" smtClean="0">
+                        <a:solidFill>
+                          <a:srgbClr val="000000"/>
+                        </a:solidFill>
+                        <a:latin typeface="Cambria Math" panose="02040503050406030204" pitchFamily="18" charset="0"/>
+                        <a:ea typeface="等线" panose="02010600030101010101" pitchFamily="2" charset="-122"/>
+                        <a:cs typeface="Times New Roman" panose="02020603050405020304" pitchFamily="18" charset="0"/>
+                      </a:rPr>
+                      <m:t>+</m:t>
+                    </m:r>
+                    <m:r>
+                      <a:rPr lang="en-US" b="1" i="1">
+                        <a:solidFill>
+                          <a:srgbClr val="7030A0"/>
+                        </a:solidFill>
+                        <a:latin typeface="Cambria Math" panose="02040503050406030204" pitchFamily="18" charset="0"/>
+                        <a:ea typeface="等线" panose="02010600030101010101" pitchFamily="2" charset="-122"/>
+                        <a:cs typeface="Times New Roman" panose="02020603050405020304" pitchFamily="18" charset="0"/>
+                      </a:rPr>
+                      <m:t>𝜶</m:t>
+                    </m:r>
+                    <m:d>
+                      <m:dPr>
+                        <m:ctrlPr>
+                          <a:rPr lang="en-US" b="1" i="1" smtClean="0">
+                            <a:solidFill>
+                              <a:schemeClr val="tx1"/>
+                            </a:solidFill>
+                            <a:latin typeface="Cambria Math" panose="02040503050406030204" pitchFamily="18" charset="0"/>
+                            <a:ea typeface="Cambria Math" panose="02040503050406030204" pitchFamily="18" charset="0"/>
+                            <a:cs typeface="Times New Roman" panose="02020603050405020304" pitchFamily="18" charset="0"/>
+                          </a:rPr>
+                        </m:ctrlPr>
+                      </m:dPr>
+                      <m:e>
+                        <m:acc>
+                          <m:accPr>
+                            <m:chr m:val="̂"/>
+                            <m:ctrlPr>
+                              <a:rPr lang="en-US" altLang="zh-CN" i="1">
+                                <a:latin typeface="Cambria Math" panose="02040503050406030204" pitchFamily="18" charset="0"/>
+                              </a:rPr>
+                            </m:ctrlPr>
+                          </m:accPr>
+                          <m:e>
+                            <m:sSub>
+                              <m:sSubPr>
+                                <m:ctrlPr>
+                                  <a:rPr lang="en-US" altLang="zh-CN" i="1">
+                                    <a:latin typeface="Cambria Math" panose="02040503050406030204" pitchFamily="18" charset="0"/>
+                                  </a:rPr>
+                                </m:ctrlPr>
+                              </m:sSubPr>
+                              <m:e>
+                                <m:r>
+                                  <a:rPr lang="en-US" altLang="zh-CN" i="1">
+                                    <a:latin typeface="Cambria Math" panose="02040503050406030204" pitchFamily="18" charset="0"/>
+                                  </a:rPr>
+                                  <m:t>𝜃</m:t>
+                                </m:r>
+                              </m:e>
+                              <m:sub>
+                                <m:r>
+                                  <a:rPr lang="en-US" altLang="zh-CN" i="1">
+                                    <a:latin typeface="Cambria Math" panose="02040503050406030204" pitchFamily="18" charset="0"/>
+                                  </a:rPr>
+                                  <m:t>𝑡</m:t>
+                                </m:r>
+                              </m:sub>
+                            </m:sSub>
+                          </m:e>
+                        </m:acc>
+                        <m:r>
+                          <a:rPr lang="en-US" altLang="zh-CN" b="0" i="1" smtClean="0">
+                            <a:latin typeface="Cambria Math" panose="02040503050406030204" pitchFamily="18" charset="0"/>
+                          </a:rPr>
+                          <m:t>−</m:t>
+                        </m:r>
+                        <m:sSub>
+                          <m:sSubPr>
+                            <m:ctrlPr>
+                              <a:rPr lang="en-US" altLang="zh-CN" i="1">
+                                <a:latin typeface="Cambria Math" panose="02040503050406030204" pitchFamily="18" charset="0"/>
+                              </a:rPr>
+                            </m:ctrlPr>
+                          </m:sSubPr>
+                          <m:e>
+                            <m:r>
+                              <a:rPr lang="en-US" altLang="zh-CN" i="1">
+                                <a:latin typeface="Cambria Math" panose="02040503050406030204" pitchFamily="18" charset="0"/>
+                              </a:rPr>
+                              <m:t>𝜃</m:t>
+                            </m:r>
+                          </m:e>
+                          <m:sub>
+                            <m:r>
+                              <a:rPr lang="en-US" altLang="zh-CN" i="1">
+                                <a:latin typeface="Cambria Math" panose="02040503050406030204" pitchFamily="18" charset="0"/>
+                              </a:rPr>
+                              <m:t>𝑡</m:t>
+                            </m:r>
+                            <m:r>
+                              <a:rPr lang="en-US" altLang="zh-CN" i="1">
+                                <a:latin typeface="Cambria Math" panose="02040503050406030204" pitchFamily="18" charset="0"/>
+                              </a:rPr>
+                              <m:t>−1</m:t>
+                            </m:r>
+                          </m:sub>
+                        </m:sSub>
+                      </m:e>
+                    </m:d>
+                  </m:oMath>
+                </a14:m>
+                <a:br>
+                  <a:rPr lang="en-US" sz="1800" b="1" i="1" kern="1200" dirty="0">
+                    <a:solidFill>
+                      <a:srgbClr val="5B9BD5"/>
+                    </a:solidFill>
+                    <a:effectLst/>
+                    <a:latin typeface="Cambria Math" panose="02040503050406030204" pitchFamily="18" charset="0"/>
+                    <a:ea typeface="等线" panose="02010600030101010101" pitchFamily="2" charset="-122"/>
+                    <a:cs typeface="Times New Roman" panose="02020603050405020304" pitchFamily="18" charset="0"/>
+                  </a:rPr>
+                </a:br>
+                <a14:m>
                   <m:oMathPara xmlns:m="http://schemas.openxmlformats.org/officeDocument/2006/math">
                     <m:oMathParaPr>
                       <m:jc m:val="centerGroup"/>
                     </m:oMathParaPr>
-                    <m:oMath xmlns:m="http://schemas.openxmlformats.org/officeDocument/2006/math">
-                      <m:sSub>
-                        <m:sSubPr>
-                          <m:ctrlPr>
-                            <a:rPr lang="zh-CN" sz="1800" i="1" kern="1200" smtClean="0">
-                              <a:solidFill>
-                                <a:srgbClr val="000000"/>
-                              </a:solidFill>
-                              <a:effectLst/>
-                              <a:latin typeface="Cambria Math" panose="02040503050406030204" pitchFamily="18" charset="0"/>
-                              <a:ea typeface="Cambria Math" panose="02040503050406030204" pitchFamily="18" charset="0"/>
-                              <a:cs typeface="Times New Roman" panose="02020603050405020304" pitchFamily="18" charset="0"/>
-                            </a:rPr>
-                          </m:ctrlPr>
-                        </m:sSubPr>
-                        <m:e>
-                          <m:r>
-                            <a:rPr lang="en-US" sz="1800" i="1" kern="1200">
-                              <a:solidFill>
-                                <a:srgbClr val="000000"/>
-                              </a:solidFill>
-                              <a:effectLst/>
-                              <a:latin typeface="Cambria Math" panose="02040503050406030204" pitchFamily="18" charset="0"/>
-                              <a:ea typeface="等线" panose="02010600030101010101" pitchFamily="2" charset="-122"/>
-                              <a:cs typeface="Times New Roman" panose="02020603050405020304" pitchFamily="18" charset="0"/>
-                            </a:rPr>
-                            <m:t>𝜃</m:t>
-                          </m:r>
-                        </m:e>
-                        <m:sub>
-                          <m:r>
-                            <a:rPr lang="en-US" sz="1800" i="1" kern="1200">
-                              <a:solidFill>
-                                <a:srgbClr val="000000"/>
-                              </a:solidFill>
-                              <a:effectLst/>
-                              <a:latin typeface="Cambria Math" panose="02040503050406030204" pitchFamily="18" charset="0"/>
-                              <a:ea typeface="等线" panose="02010600030101010101" pitchFamily="2" charset="-122"/>
-                              <a:cs typeface="Times New Roman" panose="02020603050405020304" pitchFamily="18" charset="0"/>
-                            </a:rPr>
-                            <m:t>𝑡</m:t>
-                          </m:r>
-                        </m:sub>
-                      </m:sSub>
-                      <m:r>
-                        <m:rPr>
-                          <m:aln/>
-                        </m:rPr>
-                        <a:rPr lang="en-US" sz="1800" i="1" kern="1200">
-                          <a:solidFill>
-                            <a:srgbClr val="000000"/>
-                          </a:solidFill>
-                          <a:effectLst/>
-                          <a:latin typeface="Cambria Math" panose="02040503050406030204" pitchFamily="18" charset="0"/>
-                          <a:ea typeface="等线" panose="02010600030101010101" pitchFamily="2" charset="-122"/>
-                          <a:cs typeface="Times New Roman" panose="02020603050405020304" pitchFamily="18" charset="0"/>
-                        </a:rPr>
-                        <m:t>=</m:t>
-                      </m:r>
-                      <m:sSub>
-                        <m:sSubPr>
-                          <m:ctrlPr>
-                            <a:rPr lang="zh-CN" sz="1800" i="1" kern="1200">
-                              <a:solidFill>
-                                <a:srgbClr val="000000"/>
-                              </a:solidFill>
-                              <a:effectLst/>
-                              <a:latin typeface="Cambria Math" panose="02040503050406030204" pitchFamily="18" charset="0"/>
-                              <a:ea typeface="Cambria Math" panose="02040503050406030204" pitchFamily="18" charset="0"/>
-                              <a:cs typeface="Times New Roman" panose="02020603050405020304" pitchFamily="18" charset="0"/>
-                            </a:rPr>
-                          </m:ctrlPr>
-                        </m:sSubPr>
-                        <m:e>
-                          <m:r>
-                            <a:rPr lang="en-US" sz="1800" i="1" kern="1200">
-                              <a:solidFill>
-                                <a:srgbClr val="000000"/>
-                              </a:solidFill>
-                              <a:effectLst/>
-                              <a:latin typeface="Cambria Math" panose="02040503050406030204" pitchFamily="18" charset="0"/>
-                              <a:ea typeface="等线" panose="02010600030101010101" pitchFamily="2" charset="-122"/>
-                              <a:cs typeface="Times New Roman" panose="02020603050405020304" pitchFamily="18" charset="0"/>
-                            </a:rPr>
-                            <m:t>𝜃</m:t>
-                          </m:r>
-                        </m:e>
-                        <m:sub>
-                          <m:r>
-                            <a:rPr lang="en-US" sz="1800" i="1" kern="1200">
-                              <a:solidFill>
-                                <a:srgbClr val="000000"/>
-                              </a:solidFill>
-                              <a:effectLst/>
-                              <a:latin typeface="Cambria Math" panose="02040503050406030204" pitchFamily="18" charset="0"/>
-                              <a:ea typeface="等线" panose="02010600030101010101" pitchFamily="2" charset="-122"/>
-                              <a:cs typeface="Times New Roman" panose="02020603050405020304" pitchFamily="18" charset="0"/>
-                            </a:rPr>
-                            <m:t>𝑡</m:t>
-                          </m:r>
-                          <m:r>
-                            <a:rPr lang="en-US" sz="1800" i="1" kern="1200">
-                              <a:solidFill>
-                                <a:srgbClr val="000000"/>
-                              </a:solidFill>
-                              <a:effectLst/>
-                              <a:latin typeface="Cambria Math" panose="02040503050406030204" pitchFamily="18" charset="0"/>
-                              <a:ea typeface="等线" panose="02010600030101010101" pitchFamily="2" charset="-122"/>
-                              <a:cs typeface="Times New Roman" panose="02020603050405020304" pitchFamily="18" charset="0"/>
-                            </a:rPr>
-                            <m:t>−1</m:t>
-                          </m:r>
-                        </m:sub>
-                      </m:sSub>
-                      <m:r>
-                        <a:rPr lang="en-US" sz="1800" i="1" kern="1200">
-                          <a:solidFill>
-                            <a:srgbClr val="000000"/>
-                          </a:solidFill>
-                          <a:effectLst/>
-                          <a:latin typeface="Cambria Math" panose="02040503050406030204" pitchFamily="18" charset="0"/>
-                          <a:ea typeface="等线" panose="02010600030101010101" pitchFamily="2" charset="-122"/>
-                          <a:cs typeface="Times New Roman" panose="02020603050405020304" pitchFamily="18" charset="0"/>
-                        </a:rPr>
-                        <m:t>−</m:t>
-                      </m:r>
-                      <m:r>
-                        <a:rPr lang="en-US" sz="1800" b="1" i="1" kern="1200">
-                          <a:solidFill>
-                            <a:srgbClr val="5B9BD5"/>
-                          </a:solidFill>
-                          <a:effectLst/>
-                          <a:latin typeface="Cambria Math" panose="02040503050406030204" pitchFamily="18" charset="0"/>
-                          <a:ea typeface="等线" panose="02010600030101010101" pitchFamily="2" charset="-122"/>
-                          <a:cs typeface="Times New Roman" panose="02020603050405020304" pitchFamily="18" charset="0"/>
-                        </a:rPr>
-                        <m:t>𝒍𝒓</m:t>
-                      </m:r>
-                      <m:f>
-                        <m:fPr>
-                          <m:ctrlPr>
-                            <a:rPr lang="zh-CN" sz="1800" b="1" i="1" kern="1200">
-                              <a:solidFill>
-                                <a:srgbClr val="5B9BD5"/>
-                              </a:solidFill>
-                              <a:effectLst/>
-                              <a:latin typeface="Cambria Math" panose="02040503050406030204" pitchFamily="18" charset="0"/>
-                              <a:ea typeface="Cambria Math" panose="02040503050406030204" pitchFamily="18" charset="0"/>
-                              <a:cs typeface="Times New Roman" panose="02020603050405020304" pitchFamily="18" charset="0"/>
-                            </a:rPr>
-                          </m:ctrlPr>
-                        </m:fPr>
-                        <m:num>
-                          <m:sSub>
-                            <m:sSubPr>
-                              <m:ctrlPr>
-                                <a:rPr lang="zh-CN" sz="1800" b="1" i="1" kern="1200">
-                                  <a:solidFill>
-                                    <a:srgbClr val="5B9BD5"/>
-                                  </a:solidFill>
-                                  <a:effectLst/>
-                                  <a:latin typeface="Cambria Math" panose="02040503050406030204" pitchFamily="18" charset="0"/>
-                                  <a:ea typeface="Cambria Math" panose="02040503050406030204" pitchFamily="18" charset="0"/>
-                                  <a:cs typeface="Times New Roman" panose="02020603050405020304" pitchFamily="18" charset="0"/>
-                                </a:rPr>
-                              </m:ctrlPr>
-                            </m:sSubPr>
-                            <m:e>
-                              <m:d>
-                                <m:dPr>
-                                  <m:ctrlPr>
-                                    <a:rPr lang="zh-CN" sz="1800" b="1" i="1" kern="1200">
-                                      <a:solidFill>
-                                        <a:srgbClr val="7030A0"/>
-                                      </a:solidFill>
-                                      <a:effectLst/>
-                                      <a:latin typeface="Cambria Math" panose="02040503050406030204" pitchFamily="18" charset="0"/>
-                                      <a:ea typeface="Cambria Math" panose="02040503050406030204" pitchFamily="18" charset="0"/>
-                                      <a:cs typeface="Times New Roman" panose="02020603050405020304" pitchFamily="18" charset="0"/>
-                                    </a:rPr>
-                                  </m:ctrlPr>
-                                </m:dPr>
-                                <m:e>
-                                  <m:r>
-                                    <a:rPr lang="en-US" sz="1800" b="1" i="1" kern="1200">
-                                      <a:solidFill>
-                                        <a:srgbClr val="7030A0"/>
-                                      </a:solidFill>
-                                      <a:effectLst/>
-                                      <a:latin typeface="Cambria Math" panose="02040503050406030204" pitchFamily="18" charset="0"/>
-                                      <a:ea typeface="等线" panose="02010600030101010101" pitchFamily="2" charset="-122"/>
-                                      <a:cs typeface="Times New Roman" panose="02020603050405020304" pitchFamily="18" charset="0"/>
-                                    </a:rPr>
-                                    <m:t>−</m:t>
-                                  </m:r>
-                                  <m:r>
-                                    <a:rPr lang="en-US" sz="1800" b="1" i="1" kern="1200">
-                                      <a:solidFill>
-                                        <a:srgbClr val="7030A0"/>
-                                      </a:solidFill>
-                                      <a:effectLst/>
-                                      <a:latin typeface="Cambria Math" panose="02040503050406030204" pitchFamily="18" charset="0"/>
-                                      <a:ea typeface="等线" panose="02010600030101010101" pitchFamily="2" charset="-122"/>
-                                      <a:cs typeface="Times New Roman" panose="02020603050405020304" pitchFamily="18" charset="0"/>
-                                    </a:rPr>
-                                    <m:t>𝜶</m:t>
-                                  </m:r>
-                                </m:e>
-                              </m:d>
-                              <m:r>
-                                <a:rPr lang="en-US" sz="1800" b="1" i="1" kern="1200">
-                                  <a:solidFill>
-                                    <a:srgbClr val="7030A0"/>
-                                  </a:solidFill>
-                                  <a:effectLst/>
-                                  <a:latin typeface="Cambria Math" panose="02040503050406030204" pitchFamily="18" charset="0"/>
-                                  <a:ea typeface="等线" panose="02010600030101010101" pitchFamily="2" charset="-122"/>
-                                  <a:cs typeface="Times New Roman" panose="02020603050405020304" pitchFamily="18" charset="0"/>
-                                </a:rPr>
-                                <m:t> </m:t>
-                              </m:r>
-                              <m:r>
-                                <a:rPr lang="en-US" sz="1800" b="1" i="1" kern="1200">
-                                  <a:solidFill>
-                                    <a:srgbClr val="5B9BD5"/>
-                                  </a:solidFill>
-                                  <a:effectLst/>
-                                  <a:latin typeface="Cambria Math" panose="02040503050406030204" pitchFamily="18" charset="0"/>
-                                  <a:ea typeface="等线" panose="02010600030101010101" pitchFamily="2" charset="-122"/>
-                                  <a:cs typeface="Times New Roman" panose="02020603050405020304" pitchFamily="18" charset="0"/>
-                                </a:rPr>
-                                <m:t>𝒎</m:t>
-                              </m:r>
-                            </m:e>
-                            <m:sub>
-                              <m:r>
-                                <a:rPr lang="en-US" sz="1800" b="1" i="1" kern="1200">
-                                  <a:solidFill>
-                                    <a:srgbClr val="5B9BD5"/>
-                                  </a:solidFill>
-                                  <a:effectLst/>
-                                  <a:latin typeface="Cambria Math" panose="02040503050406030204" pitchFamily="18" charset="0"/>
-                                  <a:ea typeface="等线" panose="02010600030101010101" pitchFamily="2" charset="-122"/>
-                                  <a:cs typeface="Times New Roman" panose="02020603050405020304" pitchFamily="18" charset="0"/>
-                                </a:rPr>
-                                <m:t>𝒕</m:t>
-                              </m:r>
-                            </m:sub>
-                          </m:sSub>
-                        </m:num>
-                        <m:den>
-                          <m:rad>
-                            <m:radPr>
-                              <m:degHide m:val="on"/>
-                              <m:ctrlPr>
-                                <a:rPr lang="zh-CN" sz="1800" b="1" i="1" kern="1200">
-                                  <a:solidFill>
-                                    <a:srgbClr val="5B9BD5"/>
-                                  </a:solidFill>
-                                  <a:effectLst/>
-                                  <a:latin typeface="Cambria Math" panose="02040503050406030204" pitchFamily="18" charset="0"/>
-                                  <a:ea typeface="Cambria Math" panose="02040503050406030204" pitchFamily="18" charset="0"/>
-                                  <a:cs typeface="Times New Roman" panose="02020603050405020304" pitchFamily="18" charset="0"/>
-                                </a:rPr>
-                              </m:ctrlPr>
-                            </m:radPr>
-                            <m:deg/>
-                            <m:e>
-                              <m:sSub>
-                                <m:sSubPr>
-                                  <m:ctrlPr>
-                                    <a:rPr lang="zh-CN" sz="1800" b="1" i="1" kern="1200">
-                                      <a:solidFill>
-                                        <a:srgbClr val="5B9BD5"/>
-                                      </a:solidFill>
-                                      <a:effectLst/>
-                                      <a:latin typeface="Cambria Math" panose="02040503050406030204" pitchFamily="18" charset="0"/>
-                                      <a:ea typeface="Cambria Math" panose="02040503050406030204" pitchFamily="18" charset="0"/>
-                                      <a:cs typeface="Times New Roman" panose="02020603050405020304" pitchFamily="18" charset="0"/>
-                                    </a:rPr>
-                                  </m:ctrlPr>
-                                </m:sSubPr>
-                                <m:e>
-                                  <m:r>
-                                    <a:rPr lang="en-US" sz="1800" b="1" i="1" kern="1200">
-                                      <a:solidFill>
-                                        <a:srgbClr val="5B9BD5"/>
-                                      </a:solidFill>
-                                      <a:effectLst/>
-                                      <a:latin typeface="Cambria Math" panose="02040503050406030204" pitchFamily="18" charset="0"/>
-                                      <a:ea typeface="等线" panose="02010600030101010101" pitchFamily="2" charset="-122"/>
-                                      <a:cs typeface="Times New Roman" panose="02020603050405020304" pitchFamily="18" charset="0"/>
-                                    </a:rPr>
-                                    <m:t>𝒗</m:t>
-                                  </m:r>
-                                </m:e>
-                                <m:sub>
-                                  <m:r>
-                                    <a:rPr lang="en-US" sz="1800" b="1" i="1" kern="1200">
-                                      <a:solidFill>
-                                        <a:srgbClr val="5B9BD5"/>
-                                      </a:solidFill>
-                                      <a:effectLst/>
-                                      <a:latin typeface="Cambria Math" panose="02040503050406030204" pitchFamily="18" charset="0"/>
-                                      <a:ea typeface="等线" panose="02010600030101010101" pitchFamily="2" charset="-122"/>
-                                      <a:cs typeface="Times New Roman" panose="02020603050405020304" pitchFamily="18" charset="0"/>
-                                    </a:rPr>
-                                    <m:t>𝒕</m:t>
-                                  </m:r>
-                                </m:sub>
-                              </m:sSub>
-                            </m:e>
-                          </m:rad>
-                        </m:den>
-                      </m:f>
-                    </m:oMath>
                     <m:oMath xmlns:m="http://schemas.openxmlformats.org/officeDocument/2006/math">
                       <m:r>
                         <m:rPr>
@@ -5714,8 +5944,59 @@
                           </m:r>
                         </m:sub>
                       </m:sSub>
+                      <m:d>
+                        <m:dPr>
+                          <m:ctrlPr>
+                            <a:rPr lang="en-US" sz="1800" b="0" i="1" kern="1200" smtClean="0">
+                              <a:solidFill>
+                                <a:srgbClr val="000000"/>
+                              </a:solidFill>
+                              <a:effectLst/>
+                              <a:latin typeface="Cambria Math" panose="02040503050406030204" pitchFamily="18" charset="0"/>
+                              <a:ea typeface="等线" panose="02010600030101010101" pitchFamily="2" charset="-122"/>
+                              <a:cs typeface="Times New Roman" panose="02020603050405020304" pitchFamily="18" charset="0"/>
+                            </a:rPr>
+                          </m:ctrlPr>
+                        </m:dPr>
+                        <m:e>
+                          <m:r>
+                            <a:rPr lang="en-US" sz="1800" b="0" i="1" kern="1200" smtClean="0">
+                              <a:solidFill>
+                                <a:srgbClr val="000000"/>
+                              </a:solidFill>
+                              <a:effectLst/>
+                              <a:latin typeface="Cambria Math" panose="02040503050406030204" pitchFamily="18" charset="0"/>
+                              <a:ea typeface="等线" panose="02010600030101010101" pitchFamily="2" charset="-122"/>
+                              <a:cs typeface="Times New Roman" panose="02020603050405020304" pitchFamily="18" charset="0"/>
+                            </a:rPr>
+                            <m:t>1</m:t>
+                          </m:r>
+                          <m:r>
+                            <a:rPr lang="en-US" sz="1800" b="1" i="1" kern="1200" smtClean="0">
+                              <a:solidFill>
+                                <a:srgbClr val="000000"/>
+                              </a:solidFill>
+                              <a:effectLst/>
+                              <a:latin typeface="Cambria Math" panose="02040503050406030204" pitchFamily="18" charset="0"/>
+                              <a:ea typeface="等线" panose="02010600030101010101" pitchFamily="2" charset="-122"/>
+                              <a:cs typeface="Times New Roman" panose="02020603050405020304" pitchFamily="18" charset="0"/>
+                            </a:rPr>
+                            <m:t>−</m:t>
+                          </m:r>
+                          <m:r>
+                            <a:rPr lang="en-US" altLang="zh-CN" b="1" i="1" smtClean="0">
+                              <a:solidFill>
+                                <a:srgbClr val="7030A0"/>
+                              </a:solidFill>
+                              <a:latin typeface="Cambria Math" panose="02040503050406030204" pitchFamily="18" charset="0"/>
+                              <a:cs typeface="Times New Roman" panose="02020603050405020304" pitchFamily="18" charset="0"/>
+                            </a:rPr>
+                            <m:t>𝜶</m:t>
+                          </m:r>
+                        </m:e>
+                      </m:d>
                       <m:r>
-                        <a:rPr lang="en-US" sz="1800" b="0" i="1" kern="1200" smtClean="0">
+                        <a:rPr lang="en-US" sz="1800" b="1" i="1" kern="1200" smtClean="0">
                           <a:solidFill>
                             <a:srgbClr val="000000"/>
                           </a:solidFill>
@@ -5724,29 +6005,7 @@
                           <a:ea typeface="等线" panose="02010600030101010101" pitchFamily="2" charset="-122"/>
                           <a:cs typeface="Times New Roman" panose="02020603050405020304" pitchFamily="18" charset="0"/>
                         </a:rPr>
-                        <m:t>(1+</m:t>
-                      </m:r>
-                      <m:r>
-                        <a:rPr lang="en-US" altLang="zh-CN" b="1" i="1" smtClean="0">
-                          <a:solidFill>
-                            <a:srgbClr val="7030A0"/>
-                          </a:solidFill>
-                          <a:latin typeface="Cambria Math" panose="02040503050406030204" pitchFamily="18" charset="0"/>
-                          <a:cs typeface="Times New Roman" panose="02020603050405020304" pitchFamily="18" charset="0"/>
-                        </a:rPr>
-                        <m:t>𝜶</m:t>
-                      </m:r>
-                      <m:r>
-                        <a:rPr lang="en-US" sz="1800" b="0" i="1" kern="1200" smtClean="0">
-                          <a:solidFill>
-                            <a:srgbClr val="000000"/>
-                          </a:solidFill>
-                          <a:effectLst/>
-                          <a:latin typeface="Cambria Math" panose="02040503050406030204" pitchFamily="18" charset="0"/>
-                          <a:ea typeface="等线" panose="02010600030101010101" pitchFamily="2" charset="-122"/>
-                          <a:cs typeface="Times New Roman" panose="02020603050405020304" pitchFamily="18" charset="0"/>
-                        </a:rPr>
-                        <m:t>)−</m:t>
+                        <m:t>+</m:t>
                       </m:r>
                       <m:r>
                         <a:rPr lang="en-US" altLang="zh-CN" b="1" i="1" smtClean="0">
@@ -5819,9 +6078,9 @@
                         <m:rPr>
                           <m:aln/>
                         </m:rPr>
-                        <a:rPr lang="en-US" sz="1800" b="1" i="1" kern="1200">
+                        <a:rPr lang="en-US" sz="1800" b="1" i="1" kern="1200" smtClean="0">
                           <a:solidFill>
-                            <a:srgbClr val="7030A0"/>
+                            <a:schemeClr val="tx1"/>
                           </a:solidFill>
                           <a:effectLst/>
                           <a:latin typeface="Cambria Math" panose="02040503050406030204" pitchFamily="18" charset="0"/>
@@ -5842,47 +6101,62 @@
                         </a:rPr>
                         <m:t>𝑉</m:t>
                       </m:r>
+                      <m:d>
+                        <m:dPr>
+                          <m:ctrlPr>
+                            <a:rPr lang="en-US" altLang="zh-CN" sz="1800" i="1" kern="1200">
+                              <a:solidFill>
+                                <a:srgbClr val="000000"/>
+                              </a:solidFill>
+                              <a:effectLst/>
+                              <a:latin typeface="Cambria Math" panose="02040503050406030204" pitchFamily="18" charset="0"/>
+                              <a:ea typeface="等线" panose="02010600030101010101" pitchFamily="2" charset="-122"/>
+                              <a:cs typeface="Times New Roman" panose="02020603050405020304" pitchFamily="18" charset="0"/>
+                            </a:rPr>
+                          </m:ctrlPr>
+                        </m:dPr>
+                        <m:e>
+                          <m:r>
+                            <a:rPr lang="en-US" altLang="zh-CN" i="1">
+                              <a:solidFill>
+                                <a:srgbClr val="000000"/>
+                              </a:solidFill>
+                              <a:latin typeface="Cambria Math" panose="02040503050406030204" pitchFamily="18" charset="0"/>
+                              <a:cs typeface="Times New Roman" panose="02020603050405020304" pitchFamily="18" charset="0"/>
+                            </a:rPr>
+                            <m:t>1</m:t>
+                          </m:r>
+                          <m:r>
+                            <a:rPr lang="en-US" altLang="zh-CN" b="1" i="1" smtClean="0">
+                              <a:solidFill>
+                                <a:srgbClr val="000000"/>
+                              </a:solidFill>
+                              <a:latin typeface="Cambria Math" panose="02040503050406030204" pitchFamily="18" charset="0"/>
+                              <a:cs typeface="Times New Roman" panose="02020603050405020304" pitchFamily="18" charset="0"/>
+                            </a:rPr>
+                            <m:t>−</m:t>
+                          </m:r>
+                          <m:r>
+                            <a:rPr lang="en-US" altLang="zh-CN" b="1" i="1" smtClean="0">
+                              <a:solidFill>
+                                <a:srgbClr val="7030A0"/>
+                              </a:solidFill>
+                              <a:latin typeface="Cambria Math" panose="02040503050406030204" pitchFamily="18" charset="0"/>
+                              <a:cs typeface="Times New Roman" panose="02020603050405020304" pitchFamily="18" charset="0"/>
+                            </a:rPr>
+                            <m:t>𝜶</m:t>
+                          </m:r>
+                        </m:e>
+                      </m:d>
                       <m:r>
-                        <a:rPr lang="en-US" altLang="zh-CN" i="1">
+                        <a:rPr lang="en-US" altLang="zh-CN" b="0" i="1" smtClean="0">
                           <a:solidFill>
                             <a:srgbClr val="000000"/>
                           </a:solidFill>
                           <a:latin typeface="Cambria Math" panose="02040503050406030204" pitchFamily="18" charset="0"/>
                           <a:cs typeface="Times New Roman" panose="02020603050405020304" pitchFamily="18" charset="0"/>
                         </a:rPr>
-                        <m:t>(1+</m:t>
-                      </m:r>
-                      <m:r>
-                        <a:rPr lang="en-US" altLang="zh-CN" b="1" i="1" smtClean="0">
-                          <a:solidFill>
-                            <a:srgbClr val="7030A0"/>
-                          </a:solidFill>
-                          <a:latin typeface="Cambria Math" panose="02040503050406030204" pitchFamily="18" charset="0"/>
-                          <a:cs typeface="Times New Roman" panose="02020603050405020304" pitchFamily="18" charset="0"/>
-                        </a:rPr>
-                        <m:t>𝜶</m:t>
-                      </m:r>
-                      <m:r>
-                        <a:rPr lang="en-US" altLang="zh-CN" i="1">
-                          <a:solidFill>
-                            <a:srgbClr val="000000"/>
-                          </a:solidFill>
-                          <a:latin typeface="Cambria Math" panose="02040503050406030204" pitchFamily="18" charset="0"/>
-                          <a:cs typeface="Times New Roman" panose="02020603050405020304" pitchFamily="18" charset="0"/>
-                        </a:rPr>
-                        <m:t>)</m:t>
-                      </m:r>
-                      <m:r>
-                        <a:rPr lang="en-US" sz="1800" b="0" i="1" kern="1200" smtClean="0">
-                          <a:solidFill>
-                            <a:srgbClr val="000000"/>
-                          </a:solidFill>
-                          <a:effectLst/>
-                          <a:latin typeface="Cambria Math" panose="02040503050406030204" pitchFamily="18" charset="0"/>
-                          <a:ea typeface="等线" panose="02010600030101010101" pitchFamily="2" charset="-122"/>
-                          <a:cs typeface="Times New Roman" panose="02020603050405020304" pitchFamily="18" charset="0"/>
-                        </a:rPr>
-                        <m:t>−</m:t>
+                        <m:t>+</m:t>
                       </m:r>
                       <m:r>
                         <a:rPr lang="en-US" altLang="zh-CN" b="1" i="1" smtClean="0">
@@ -6057,53 +6331,45 @@
                       <m:d>
                         <m:dPr>
                           <m:ctrlPr>
-                            <a:rPr lang="en-US" sz="1800" b="1" i="1" kern="1200" smtClean="0">
+                            <a:rPr lang="en-US" altLang="zh-CN" i="1" smtClean="0">
                               <a:solidFill>
-                                <a:srgbClr val="A6A6A6"/>
+                                <a:schemeClr val="accent3"/>
                               </a:solidFill>
-                              <a:effectLst/>
                               <a:latin typeface="Cambria Math" panose="02040503050406030204" pitchFamily="18" charset="0"/>
-                              <a:ea typeface="等线" panose="02010600030101010101" pitchFamily="2" charset="-122"/>
                               <a:cs typeface="Times New Roman" panose="02020603050405020304" pitchFamily="18" charset="0"/>
                             </a:rPr>
                           </m:ctrlPr>
                         </m:dPr>
                         <m:e>
                           <m:r>
-                            <a:rPr lang="en-US" sz="1800" b="1" i="1" kern="1200">
+                            <a:rPr lang="en-US" altLang="zh-CN" i="1">
+                              <a:solidFill>
+                                <a:schemeClr val="accent3"/>
+                              </a:solidFill>
+                              <a:latin typeface="Cambria Math" panose="02040503050406030204" pitchFamily="18" charset="0"/>
+                              <a:cs typeface="Times New Roman" panose="02020603050405020304" pitchFamily="18" charset="0"/>
+                            </a:rPr>
+                            <m:t>1</m:t>
+                          </m:r>
+                          <m:r>
+                            <a:rPr lang="en-US" altLang="zh-CN" b="1" i="1">
+                              <a:solidFill>
+                                <a:schemeClr val="accent3"/>
+                              </a:solidFill>
+                              <a:latin typeface="Cambria Math" panose="02040503050406030204" pitchFamily="18" charset="0"/>
+                              <a:cs typeface="Times New Roman" panose="02020603050405020304" pitchFamily="18" charset="0"/>
+                            </a:rPr>
+                            <m:t>−</m:t>
+                          </m:r>
+                          <m:r>
+                            <a:rPr lang="en-US" altLang="zh-CN" b="1" i="1" smtClean="0">
                               <a:solidFill>
                                 <a:srgbClr val="7030A0"/>
                               </a:solidFill>
-                              <a:effectLst/>
                               <a:latin typeface="Cambria Math" panose="02040503050406030204" pitchFamily="18" charset="0"/>
-                              <a:ea typeface="等线" panose="02010600030101010101" pitchFamily="2" charset="-122"/>
                               <a:cs typeface="Times New Roman" panose="02020603050405020304" pitchFamily="18" charset="0"/>
                             </a:rPr>
                             <m:t>𝜶</m:t>
-                          </m:r>
-                          <m:r>
-                            <a:rPr lang="en-US" sz="1800" b="1" i="1" kern="1200" smtClean="0">
-                              <a:solidFill>
-                                <a:srgbClr val="7030A0"/>
-                              </a:solidFill>
-                              <a:effectLst/>
-                              <a:latin typeface="Cambria Math" panose="02040503050406030204" pitchFamily="18" charset="0"/>
-                              <a:ea typeface="等线" panose="02010600030101010101" pitchFamily="2" charset="-122"/>
-                              <a:cs typeface="Times New Roman" panose="02020603050405020304" pitchFamily="18" charset="0"/>
-                            </a:rPr>
-                            <m:t>+</m:t>
-                          </m:r>
-                          <m:r>
-                            <a:rPr lang="en-US" sz="1800" b="1" i="1" kern="1200" smtClean="0">
-                              <a:solidFill>
-                                <a:srgbClr val="7030A0"/>
-                              </a:solidFill>
-                              <a:effectLst/>
-                              <a:latin typeface="Cambria Math" panose="02040503050406030204" pitchFamily="18" charset="0"/>
-                              <a:ea typeface="等线" panose="02010600030101010101" pitchFamily="2" charset="-122"/>
-                              <a:cs typeface="Times New Roman" panose="02020603050405020304" pitchFamily="18" charset="0"/>
-                            </a:rPr>
-                            <m:t>𝟏</m:t>
                           </m:r>
                         </m:e>
                       </m:d>
@@ -6137,8 +6403,8 @@
             </p:nvSpPr>
             <p:spPr>
               <a:xfrm>
-                <a:off x="3751150" y="363322"/>
-                <a:ext cx="4402417" cy="1176669"/>
+                <a:off x="4064789" y="409642"/>
+                <a:ext cx="4402417" cy="991938"/>
               </a:xfrm>
               <a:prstGeom prst="rect">
                 <a:avLst/>
@@ -6146,7 +6412,7 @@
               <a:blipFill>
                 <a:blip r:embed="rId7"/>
                 <a:stretch>
-                  <a:fillRect b="-7254"/>
+                  <a:fillRect l="-1724" t="-2532" b="-3797"/>
                 </a:stretch>
               </a:blipFill>
             </p:spPr>
@@ -6155,7 +6421,7 @@
               <a:lstStyle/>
               <a:p>
                 <a:r>
-                  <a:rPr lang="zh-CN" altLang="en-US">
+                  <a:rPr lang="en-US">
                     <a:noFill/>
                   </a:rPr>
                   <a:t> </a:t>
@@ -6465,8 +6731,8 @@
           </a:fontRef>
         </p:style>
       </p:cxnSp>
-      <mc:AlternateContent xmlns:mc="http://schemas.openxmlformats.org/markup-compatibility/2006">
-        <mc:Choice xmlns:a14="http://schemas.microsoft.com/office/drawing/2010/main" Requires="a14">
+      <mc:AlternateContent xmlns:mc="http://schemas.openxmlformats.org/markup-compatibility/2006" xmlns:a14="http://schemas.microsoft.com/office/drawing/2010/main">
+        <mc:Choice Requires="a14">
           <p:sp>
             <p:nvSpPr>
               <p:cNvPr id="6" name="文本框 5">
@@ -6495,6 +6761,7 @@
               </a:bodyPr>
               <a:lstStyle/>
               <a:p>
+                <a:pPr/>
                 <a14:m>
                   <m:oMathPara xmlns:m="http://schemas.openxmlformats.org/officeDocument/2006/math">
                     <m:oMathParaPr>
@@ -6515,7 +6782,7 @@
             </p:txBody>
           </p:sp>
         </mc:Choice>
-        <mc:Fallback>
+        <mc:Fallback xmlns="">
           <p:sp>
             <p:nvSpPr>
               <p:cNvPr id="6" name="文本框 5">
@@ -6560,8 +6827,8 @@
           </p:sp>
         </mc:Fallback>
       </mc:AlternateContent>
-      <mc:AlternateContent xmlns:mc="http://schemas.openxmlformats.org/markup-compatibility/2006">
-        <mc:Choice xmlns:a14="http://schemas.microsoft.com/office/drawing/2010/main" Requires="a14">
+      <mc:AlternateContent xmlns:mc="http://schemas.openxmlformats.org/markup-compatibility/2006" xmlns:a14="http://schemas.microsoft.com/office/drawing/2010/main">
+        <mc:Choice Requires="a14">
           <p:sp>
             <p:nvSpPr>
               <p:cNvPr id="7" name="文本框 6">
@@ -6590,6 +6857,7 @@
               </a:bodyPr>
               <a:lstStyle/>
               <a:p>
+                <a:pPr/>
                 <a14:m>
                   <m:oMathPara xmlns:m="http://schemas.openxmlformats.org/officeDocument/2006/math">
                     <m:oMathParaPr>
@@ -6610,7 +6878,7 @@
             </p:txBody>
           </p:sp>
         </mc:Choice>
-        <mc:Fallback>
+        <mc:Fallback xmlns="">
           <p:sp>
             <p:nvSpPr>
               <p:cNvPr id="7" name="文本框 6">
@@ -6655,8 +6923,8 @@
           </p:sp>
         </mc:Fallback>
       </mc:AlternateContent>
-      <mc:AlternateContent xmlns:mc="http://schemas.openxmlformats.org/markup-compatibility/2006">
-        <mc:Choice xmlns:a14="http://schemas.microsoft.com/office/drawing/2010/main" Requires="a14">
+      <mc:AlternateContent xmlns:mc="http://schemas.openxmlformats.org/markup-compatibility/2006" xmlns:a14="http://schemas.microsoft.com/office/drawing/2010/main">
+        <mc:Choice Requires="a14">
           <p:sp>
             <p:nvSpPr>
               <p:cNvPr id="9" name="文本框 8">
@@ -6685,6 +6953,7 @@
               </a:bodyPr>
               <a:lstStyle/>
               <a:p>
+                <a:pPr/>
                 <a14:m>
                   <m:oMathPara xmlns:m="http://schemas.openxmlformats.org/officeDocument/2006/math">
                     <m:oMathParaPr>
@@ -6705,7 +6974,7 @@
             </p:txBody>
           </p:sp>
         </mc:Choice>
-        <mc:Fallback>
+        <mc:Fallback xmlns="">
           <p:sp>
             <p:nvSpPr>
               <p:cNvPr id="9" name="文本框 8">
@@ -6750,8 +7019,8 @@
           </p:sp>
         </mc:Fallback>
       </mc:AlternateContent>
-      <mc:AlternateContent xmlns:mc="http://schemas.openxmlformats.org/markup-compatibility/2006">
-        <mc:Choice xmlns:a14="http://schemas.microsoft.com/office/drawing/2010/main" Requires="a14">
+      <mc:AlternateContent xmlns:mc="http://schemas.openxmlformats.org/markup-compatibility/2006" xmlns:a14="http://schemas.microsoft.com/office/drawing/2010/main">
+        <mc:Choice Requires="a14">
           <p:sp>
             <p:nvSpPr>
               <p:cNvPr id="11" name="文本框 10">
@@ -6780,6 +7049,7 @@
               </a:bodyPr>
               <a:lstStyle/>
               <a:p>
+                <a:pPr/>
                 <a14:m>
                   <m:oMathPara xmlns:m="http://schemas.openxmlformats.org/officeDocument/2006/math">
                     <m:oMathParaPr>
@@ -6800,7 +7070,7 @@
             </p:txBody>
           </p:sp>
         </mc:Choice>
-        <mc:Fallback>
+        <mc:Fallback xmlns="">
           <p:sp>
             <p:nvSpPr>
               <p:cNvPr id="11" name="文本框 10">

</xml_diff>

<commit_message>
enable efficientnet on tiny imagenet
</commit_message>
<xml_diff>
--- a/fig/演示文稿1.pptx
+++ b/fig/演示文稿1.pptx
@@ -260,7 +260,7 @@
           <a:p>
             <a:fld id="{8F27BD3B-15C5-4116-87CF-B26CBD3233A6}" type="datetimeFigureOut">
               <a:rPr lang="zh-CN" altLang="en-US" smtClean="0"/>
-              <a:t>2020/1/14</a:t>
+              <a:t>2020/1/24</a:t>
             </a:fld>
             <a:endParaRPr lang="zh-CN" altLang="en-US"/>
           </a:p>
@@ -458,7 +458,7 @@
           <a:p>
             <a:fld id="{8F27BD3B-15C5-4116-87CF-B26CBD3233A6}" type="datetimeFigureOut">
               <a:rPr lang="zh-CN" altLang="en-US" smtClean="0"/>
-              <a:t>2020/1/14</a:t>
+              <a:t>2020/1/24</a:t>
             </a:fld>
             <a:endParaRPr lang="zh-CN" altLang="en-US"/>
           </a:p>
@@ -666,7 +666,7 @@
           <a:p>
             <a:fld id="{8F27BD3B-15C5-4116-87CF-B26CBD3233A6}" type="datetimeFigureOut">
               <a:rPr lang="zh-CN" altLang="en-US" smtClean="0"/>
-              <a:t>2020/1/14</a:t>
+              <a:t>2020/1/24</a:t>
             </a:fld>
             <a:endParaRPr lang="zh-CN" altLang="en-US"/>
           </a:p>
@@ -864,7 +864,7 @@
           <a:p>
             <a:fld id="{8F27BD3B-15C5-4116-87CF-B26CBD3233A6}" type="datetimeFigureOut">
               <a:rPr lang="zh-CN" altLang="en-US" smtClean="0"/>
-              <a:t>2020/1/14</a:t>
+              <a:t>2020/1/24</a:t>
             </a:fld>
             <a:endParaRPr lang="zh-CN" altLang="en-US"/>
           </a:p>
@@ -1139,7 +1139,7 @@
           <a:p>
             <a:fld id="{8F27BD3B-15C5-4116-87CF-B26CBD3233A6}" type="datetimeFigureOut">
               <a:rPr lang="zh-CN" altLang="en-US" smtClean="0"/>
-              <a:t>2020/1/14</a:t>
+              <a:t>2020/1/24</a:t>
             </a:fld>
             <a:endParaRPr lang="zh-CN" altLang="en-US"/>
           </a:p>
@@ -1404,7 +1404,7 @@
           <a:p>
             <a:fld id="{8F27BD3B-15C5-4116-87CF-B26CBD3233A6}" type="datetimeFigureOut">
               <a:rPr lang="zh-CN" altLang="en-US" smtClean="0"/>
-              <a:t>2020/1/14</a:t>
+              <a:t>2020/1/24</a:t>
             </a:fld>
             <a:endParaRPr lang="zh-CN" altLang="en-US"/>
           </a:p>
@@ -1816,7 +1816,7 @@
           <a:p>
             <a:fld id="{8F27BD3B-15C5-4116-87CF-B26CBD3233A6}" type="datetimeFigureOut">
               <a:rPr lang="zh-CN" altLang="en-US" smtClean="0"/>
-              <a:t>2020/1/14</a:t>
+              <a:t>2020/1/24</a:t>
             </a:fld>
             <a:endParaRPr lang="zh-CN" altLang="en-US"/>
           </a:p>
@@ -1957,7 +1957,7 @@
           <a:p>
             <a:fld id="{8F27BD3B-15C5-4116-87CF-B26CBD3233A6}" type="datetimeFigureOut">
               <a:rPr lang="zh-CN" altLang="en-US" smtClean="0"/>
-              <a:t>2020/1/14</a:t>
+              <a:t>2020/1/24</a:t>
             </a:fld>
             <a:endParaRPr lang="zh-CN" altLang="en-US"/>
           </a:p>
@@ -2070,7 +2070,7 @@
           <a:p>
             <a:fld id="{8F27BD3B-15C5-4116-87CF-B26CBD3233A6}" type="datetimeFigureOut">
               <a:rPr lang="zh-CN" altLang="en-US" smtClean="0"/>
-              <a:t>2020/1/14</a:t>
+              <a:t>2020/1/24</a:t>
             </a:fld>
             <a:endParaRPr lang="zh-CN" altLang="en-US"/>
           </a:p>
@@ -2381,7 +2381,7 @@
           <a:p>
             <a:fld id="{8F27BD3B-15C5-4116-87CF-B26CBD3233A6}" type="datetimeFigureOut">
               <a:rPr lang="zh-CN" altLang="en-US" smtClean="0"/>
-              <a:t>2020/1/14</a:t>
+              <a:t>2020/1/24</a:t>
             </a:fld>
             <a:endParaRPr lang="zh-CN" altLang="en-US"/>
           </a:p>
@@ -2669,7 +2669,7 @@
           <a:p>
             <a:fld id="{8F27BD3B-15C5-4116-87CF-B26CBD3233A6}" type="datetimeFigureOut">
               <a:rPr lang="zh-CN" altLang="en-US" smtClean="0"/>
-              <a:t>2020/1/14</a:t>
+              <a:t>2020/1/24</a:t>
             </a:fld>
             <a:endParaRPr lang="zh-CN" altLang="en-US"/>
           </a:p>
@@ -2910,7 +2910,7 @@
           <a:p>
             <a:fld id="{8F27BD3B-15C5-4116-87CF-B26CBD3233A6}" type="datetimeFigureOut">
               <a:rPr lang="zh-CN" altLang="en-US" smtClean="0"/>
-              <a:t>2020/1/14</a:t>
+              <a:t>2020/1/24</a:t>
             </a:fld>
             <a:endParaRPr lang="zh-CN" altLang="en-US"/>
           </a:p>
@@ -3789,8 +3789,8 @@
           </a:p>
         </p:txBody>
       </p:sp>
-      <mc:AlternateContent xmlns:mc="http://schemas.openxmlformats.org/markup-compatibility/2006">
-        <mc:Choice xmlns:a14="http://schemas.microsoft.com/office/drawing/2010/main" Requires="a14">
+      <mc:AlternateContent xmlns:mc="http://schemas.openxmlformats.org/markup-compatibility/2006" xmlns:a14="http://schemas.microsoft.com/office/drawing/2010/main">
+        <mc:Choice Requires="a14">
           <p:sp>
             <p:nvSpPr>
               <p:cNvPr id="40" name="文本框 39">
@@ -4052,7 +4052,7 @@
             </p:txBody>
           </p:sp>
         </mc:Choice>
-        <mc:Fallback>
+        <mc:Fallback xmlns="">
           <p:sp>
             <p:nvSpPr>
               <p:cNvPr id="40" name="文本框 39">
@@ -4315,8 +4315,8 @@
           </a:fontRef>
         </p:style>
       </p:cxnSp>
-      <mc:AlternateContent xmlns:mc="http://schemas.openxmlformats.org/markup-compatibility/2006">
-        <mc:Choice xmlns:a14="http://schemas.microsoft.com/office/drawing/2010/main" Requires="a14">
+      <mc:AlternateContent xmlns:mc="http://schemas.openxmlformats.org/markup-compatibility/2006" xmlns:a14="http://schemas.microsoft.com/office/drawing/2010/main">
+        <mc:Choice Requires="a14">
           <p:sp>
             <p:nvSpPr>
               <p:cNvPr id="66" name="文本框 65">
@@ -4387,7 +4387,7 @@
             </p:txBody>
           </p:sp>
         </mc:Choice>
-        <mc:Fallback>
+        <mc:Fallback xmlns="">
           <p:sp>
             <p:nvSpPr>
               <p:cNvPr id="66" name="文本框 65">
@@ -4432,8 +4432,8 @@
           </p:sp>
         </mc:Fallback>
       </mc:AlternateContent>
-      <mc:AlternateContent xmlns:mc="http://schemas.openxmlformats.org/markup-compatibility/2006">
-        <mc:Choice xmlns:a14="http://schemas.microsoft.com/office/drawing/2010/main" Requires="a14">
+      <mc:AlternateContent xmlns:mc="http://schemas.openxmlformats.org/markup-compatibility/2006" xmlns:a14="http://schemas.microsoft.com/office/drawing/2010/main">
+        <mc:Choice Requires="a14">
           <p:sp>
             <p:nvSpPr>
               <p:cNvPr id="67" name="文本框 66">
@@ -4504,7 +4504,7 @@
             </p:txBody>
           </p:sp>
         </mc:Choice>
-        <mc:Fallback>
+        <mc:Fallback xmlns="">
           <p:sp>
             <p:nvSpPr>
               <p:cNvPr id="67" name="文本框 66">
@@ -4549,8 +4549,8 @@
           </p:sp>
         </mc:Fallback>
       </mc:AlternateContent>
-      <mc:AlternateContent xmlns:mc="http://schemas.openxmlformats.org/markup-compatibility/2006">
-        <mc:Choice xmlns:a14="http://schemas.microsoft.com/office/drawing/2010/main" Requires="a14">
+      <mc:AlternateContent xmlns:mc="http://schemas.openxmlformats.org/markup-compatibility/2006" xmlns:a14="http://schemas.microsoft.com/office/drawing/2010/main">
+        <mc:Choice Requires="a14">
           <p:sp>
             <p:nvSpPr>
               <p:cNvPr id="74" name="文本框 73">
@@ -4579,6 +4579,7 @@
               </a:bodyPr>
               <a:lstStyle/>
               <a:p>
+                <a:pPr/>
                 <a14:m>
                   <m:oMathPara xmlns:m="http://schemas.openxmlformats.org/officeDocument/2006/math">
                     <m:oMathParaPr>
@@ -4588,18 +4589,24 @@
                       <m:sSub>
                         <m:sSubPr>
                           <m:ctrlPr>
-                            <a:rPr lang="en-US" i="1"/>
+                            <a:rPr lang="en-US" i="1">
+                              <a:latin typeface="Cambria Math" panose="02040503050406030204" pitchFamily="18" charset="0"/>
+                            </a:rPr>
                           </m:ctrlPr>
                         </m:sSubPr>
                         <m:e>
                           <m:r>
-                            <a:rPr lang="en-US" i="1"/>
+                            <a:rPr lang="en-US" i="1">
+                              <a:latin typeface="Cambria Math" panose="02040503050406030204" pitchFamily="18" charset="0"/>
+                            </a:rPr>
                             <m:t>𝜃</m:t>
                           </m:r>
                         </m:e>
                         <m:sub>
                           <m:r>
-                            <a:rPr lang="en-US" i="1"/>
+                            <a:rPr lang="en-US" i="1">
+                              <a:latin typeface="Cambria Math" panose="02040503050406030204" pitchFamily="18" charset="0"/>
+                            </a:rPr>
                             <m:t>𝑡</m:t>
                           </m:r>
                         </m:sub>
@@ -4608,26 +4615,36 @@
                         <m:rPr>
                           <m:aln/>
                         </m:rPr>
-                        <a:rPr lang="en-US" b="1" i="1"/>
+                        <a:rPr lang="en-US" b="1" i="1">
+                          <a:latin typeface="Cambria Math" panose="02040503050406030204" pitchFamily="18" charset="0"/>
+                        </a:rPr>
                         <m:t>=</m:t>
                       </m:r>
                       <m:r>
-                        <a:rPr lang="en-US" i="1"/>
+                        <a:rPr lang="en-US" i="1">
+                          <a:latin typeface="Cambria Math" panose="02040503050406030204" pitchFamily="18" charset="0"/>
+                        </a:rPr>
                         <m:t>𝑉</m:t>
                       </m:r>
                       <m:d>
                         <m:dPr>
                           <m:ctrlPr>
-                            <a:rPr lang="en-US" i="1"/>
+                            <a:rPr lang="en-US" i="1">
+                              <a:latin typeface="Cambria Math" panose="02040503050406030204" pitchFamily="18" charset="0"/>
+                            </a:rPr>
                           </m:ctrlPr>
                         </m:dPr>
                         <m:e>
                           <m:r>
-                            <a:rPr lang="en-US" i="1"/>
+                            <a:rPr lang="en-US" i="1">
+                              <a:latin typeface="Cambria Math" panose="02040503050406030204" pitchFamily="18" charset="0"/>
+                            </a:rPr>
                             <m:t>1</m:t>
                           </m:r>
                           <m:r>
-                            <a:rPr lang="en-US" b="1" i="1"/>
+                            <a:rPr lang="en-US" b="1" i="1">
+                              <a:latin typeface="Cambria Math" panose="02040503050406030204" pitchFamily="18" charset="0"/>
+                            </a:rPr>
                             <m:t>−</m:t>
                           </m:r>
                           <m:r>
@@ -4635,13 +4652,16 @@
                               <a:solidFill>
                                 <a:srgbClr val="7030A0"/>
                               </a:solidFill>
+                              <a:latin typeface="Cambria Math" panose="02040503050406030204" pitchFamily="18" charset="0"/>
                             </a:rPr>
                             <m:t>𝜶</m:t>
                           </m:r>
                         </m:e>
                       </m:d>
                       <m:r>
-                        <a:rPr lang="en-US" i="1"/>
+                        <a:rPr lang="en-US" i="1">
+                          <a:latin typeface="Cambria Math" panose="02040503050406030204" pitchFamily="18" charset="0"/>
+                        </a:rPr>
                         <m:t>+</m:t>
                       </m:r>
                       <m:r>
@@ -4649,13 +4669,16 @@
                           <a:solidFill>
                             <a:srgbClr val="7030A0"/>
                           </a:solidFill>
+                          <a:latin typeface="Cambria Math" panose="02040503050406030204" pitchFamily="18" charset="0"/>
                         </a:rPr>
                         <m:t>𝜶</m:t>
                       </m:r>
                       <m:sSub>
                         <m:sSubPr>
                           <m:ctrlPr>
-                            <a:rPr lang="en-US" i="1"/>
+                            <a:rPr lang="en-US" i="1">
+                              <a:latin typeface="Cambria Math" panose="02040503050406030204" pitchFamily="18" charset="0"/>
+                            </a:rPr>
                           </m:ctrlPr>
                         </m:sSubPr>
                         <m:e>
@@ -4663,12 +4686,16 @@
                             <m:accPr>
                               <m:chr m:val="̂"/>
                               <m:ctrlPr>
-                                <a:rPr lang="en-US" i="1"/>
+                                <a:rPr lang="en-US" i="1">
+                                  <a:latin typeface="Cambria Math" panose="02040503050406030204" pitchFamily="18" charset="0"/>
+                                </a:rPr>
                               </m:ctrlPr>
                             </m:accPr>
                             <m:e>
                               <m:r>
-                                <a:rPr lang="en-US" i="1"/>
+                                <a:rPr lang="en-US" i="1">
+                                  <a:latin typeface="Cambria Math" panose="02040503050406030204" pitchFamily="18" charset="0"/>
+                                </a:rPr>
                                 <m:t>𝜃</m:t>
                               </m:r>
                             </m:e>
@@ -4676,7 +4703,9 @@
                         </m:e>
                         <m:sub>
                           <m:r>
-                            <a:rPr lang="en-US" i="1"/>
+                            <a:rPr lang="en-US" i="1">
+                              <a:latin typeface="Cambria Math" panose="02040503050406030204" pitchFamily="18" charset="0"/>
+                            </a:rPr>
                             <m:t>𝑡</m:t>
                           </m:r>
                         </m:sub>
@@ -4687,13 +4716,17 @@
                         <m:rPr>
                           <m:aln/>
                         </m:rPr>
-                        <a:rPr lang="en-US" i="1"/>
+                        <a:rPr lang="en-US" i="1">
+                          <a:latin typeface="Cambria Math" panose="02040503050406030204" pitchFamily="18" charset="0"/>
+                        </a:rPr>
                         <m:t>=</m:t>
                       </m:r>
                       <m:sSub>
                         <m:sSubPr>
                           <m:ctrlPr>
-                            <a:rPr lang="en-US" i="1"/>
+                            <a:rPr lang="en-US" i="1">
+                              <a:latin typeface="Cambria Math" panose="02040503050406030204" pitchFamily="18" charset="0"/>
+                            </a:rPr>
                           </m:ctrlPr>
                         </m:sSubPr>
                         <m:e>
@@ -4701,12 +4734,16 @@
                             <m:accPr>
                               <m:chr m:val="̂"/>
                               <m:ctrlPr>
-                                <a:rPr lang="en-US" i="1"/>
+                                <a:rPr lang="en-US" i="1">
+                                  <a:latin typeface="Cambria Math" panose="02040503050406030204" pitchFamily="18" charset="0"/>
+                                </a:rPr>
                               </m:ctrlPr>
                             </m:accPr>
                             <m:e>
                               <m:r>
-                                <a:rPr lang="en-US" i="1"/>
+                                <a:rPr lang="en-US" i="1">
+                                  <a:latin typeface="Cambria Math" panose="02040503050406030204" pitchFamily="18" charset="0"/>
+                                </a:rPr>
                                 <m:t>𝜃</m:t>
                               </m:r>
                             </m:e>
@@ -4714,13 +4751,17 @@
                         </m:e>
                         <m:sub>
                           <m:r>
-                            <a:rPr lang="en-US" i="1"/>
+                            <a:rPr lang="en-US" i="1">
+                              <a:latin typeface="Cambria Math" panose="02040503050406030204" pitchFamily="18" charset="0"/>
+                            </a:rPr>
                             <m:t>𝑡</m:t>
                           </m:r>
                         </m:sub>
                       </m:sSub>
                       <m:r>
-                        <a:rPr lang="en-US" b="1"/>
+                        <a:rPr lang="en-US" b="1">
+                          <a:latin typeface="Cambria Math" panose="02040503050406030204" pitchFamily="18" charset="0"/>
+                        </a:rPr>
                         <m:t>+</m:t>
                       </m:r>
                       <m:d>
@@ -4756,21 +4797,29 @@
                         </m:e>
                       </m:d>
                       <m:r>
-                        <a:rPr lang="en-US" i="1"/>
+                        <a:rPr lang="en-US" i="1">
+                          <a:latin typeface="Cambria Math" panose="02040503050406030204" pitchFamily="18" charset="0"/>
+                        </a:rPr>
                         <m:t>(</m:t>
                       </m:r>
                       <m:r>
-                        <a:rPr lang="en-US" i="1"/>
+                        <a:rPr lang="en-US" i="1">
+                          <a:latin typeface="Cambria Math" panose="02040503050406030204" pitchFamily="18" charset="0"/>
+                        </a:rPr>
                         <m:t>𝑉</m:t>
                       </m:r>
                       <m:r>
-                        <a:rPr lang="en-US" i="1"/>
+                        <a:rPr lang="en-US" i="1">
+                          <a:latin typeface="Cambria Math" panose="02040503050406030204" pitchFamily="18" charset="0"/>
+                        </a:rPr>
                         <m:t>−</m:t>
                       </m:r>
                       <m:sSub>
                         <m:sSubPr>
                           <m:ctrlPr>
-                            <a:rPr lang="en-US" i="1"/>
+                            <a:rPr lang="en-US" i="1">
+                              <a:latin typeface="Cambria Math" panose="02040503050406030204" pitchFamily="18" charset="0"/>
+                            </a:rPr>
                           </m:ctrlPr>
                         </m:sSubPr>
                         <m:e>
@@ -4778,12 +4827,16 @@
                             <m:accPr>
                               <m:chr m:val="̂"/>
                               <m:ctrlPr>
-                                <a:rPr lang="en-US" i="1"/>
+                                <a:rPr lang="en-US" i="1">
+                                  <a:latin typeface="Cambria Math" panose="02040503050406030204" pitchFamily="18" charset="0"/>
+                                </a:rPr>
                               </m:ctrlPr>
                             </m:accPr>
                             <m:e>
                               <m:r>
-                                <a:rPr lang="en-US" i="1"/>
+                                <a:rPr lang="en-US" i="1">
+                                  <a:latin typeface="Cambria Math" panose="02040503050406030204" pitchFamily="18" charset="0"/>
+                                </a:rPr>
                                 <m:t>𝜃</m:t>
                               </m:r>
                             </m:e>
@@ -4791,13 +4844,17 @@
                         </m:e>
                         <m:sub>
                           <m:r>
-                            <a:rPr lang="en-US" i="1"/>
+                            <a:rPr lang="en-US" i="1">
+                              <a:latin typeface="Cambria Math" panose="02040503050406030204" pitchFamily="18" charset="0"/>
+                            </a:rPr>
                             <m:t>𝑡</m:t>
                           </m:r>
                         </m:sub>
                       </m:sSub>
                       <m:r>
-                        <a:rPr lang="en-US" i="1"/>
+                        <a:rPr lang="en-US" i="1">
+                          <a:latin typeface="Cambria Math" panose="02040503050406030204" pitchFamily="18" charset="0"/>
+                        </a:rPr>
                         <m:t>)</m:t>
                       </m:r>
                     </m:oMath>
@@ -4808,7 +4865,7 @@
             </p:txBody>
           </p:sp>
         </mc:Choice>
-        <mc:Fallback>
+        <mc:Fallback xmlns="">
           <p:sp>
             <p:nvSpPr>
               <p:cNvPr id="74" name="文本框 73">
@@ -4853,8 +4910,8 @@
           </p:sp>
         </mc:Fallback>
       </mc:AlternateContent>
-      <mc:AlternateContent xmlns:mc="http://schemas.openxmlformats.org/markup-compatibility/2006">
-        <mc:Choice xmlns:a14="http://schemas.microsoft.com/office/drawing/2010/main" Requires="a14">
+      <mc:AlternateContent xmlns:mc="http://schemas.openxmlformats.org/markup-compatibility/2006" xmlns:a14="http://schemas.microsoft.com/office/drawing/2010/main">
+        <mc:Choice Requires="a14">
           <p:sp>
             <p:nvSpPr>
               <p:cNvPr id="75" name="矩形 74">
@@ -5087,7 +5144,7 @@
             </p:txBody>
           </p:sp>
         </mc:Choice>
-        <mc:Fallback>
+        <mc:Fallback xmlns="">
           <p:sp>
             <p:nvSpPr>
               <p:cNvPr id="75" name="矩形 74">
@@ -5357,8 +5414,8 @@
           </a:fontRef>
         </p:style>
       </p:cxnSp>
-      <mc:AlternateContent xmlns:mc="http://schemas.openxmlformats.org/markup-compatibility/2006">
-        <mc:Choice xmlns:a14="http://schemas.microsoft.com/office/drawing/2010/main" Requires="a14">
+      <mc:AlternateContent xmlns:mc="http://schemas.openxmlformats.org/markup-compatibility/2006" xmlns:a14="http://schemas.microsoft.com/office/drawing/2010/main">
+        <mc:Choice Requires="a14">
           <p:sp>
             <p:nvSpPr>
               <p:cNvPr id="86" name="文本框 79">
@@ -6386,7 +6443,7 @@
             </p:txBody>
           </p:sp>
         </mc:Choice>
-        <mc:Fallback>
+        <mc:Fallback xmlns="">
           <p:sp>
             <p:nvSpPr>
               <p:cNvPr id="86" name="文本框 79">
@@ -6519,8 +6576,8 @@
         </p:nvSpPr>
         <p:spPr>
           <a:xfrm>
-            <a:off x="4828429" y="4323553"/>
-            <a:ext cx="3634815" cy="612877"/>
+            <a:off x="4810557" y="1336430"/>
+            <a:ext cx="3654058" cy="1159129"/>
           </a:xfrm>
           <a:prstGeom prst="rect">
             <a:avLst/>
@@ -6561,10 +6618,6 @@
               <a:t>Diverge Regime</a:t>
             </a:r>
           </a:p>
-          <a:p>
-            <a:pPr algn="ctr"/>
-            <a:endParaRPr lang="zh-CN" altLang="en-US" dirty="0"/>
-          </a:p>
         </p:txBody>
       </p:sp>
       <p:sp>
@@ -6581,8 +6634,8 @@
         </p:nvSpPr>
         <p:spPr>
           <a:xfrm rot="10800000">
-            <a:off x="4860323" y="1336426"/>
-            <a:ext cx="3602927" cy="2970955"/>
+            <a:off x="4860318" y="2495558"/>
+            <a:ext cx="3602927" cy="2440871"/>
           </a:xfrm>
           <a:prstGeom prst="rect">
             <a:avLst/>
@@ -6700,8 +6753,8 @@
         </p:nvCxnSpPr>
         <p:spPr>
           <a:xfrm flipV="1">
-            <a:off x="4828430" y="1336430"/>
-            <a:ext cx="0" cy="3600000"/>
+            <a:off x="4827027" y="1336430"/>
+            <a:ext cx="1403" cy="3600000"/>
           </a:xfrm>
           <a:prstGeom prst="straightConnector1">
             <a:avLst/>
@@ -7188,9 +7241,9 @@
           <p:nvPr/>
         </p:nvCxnSpPr>
         <p:spPr>
-          <a:xfrm flipH="1" flipV="1">
-            <a:off x="4831361" y="3400555"/>
-            <a:ext cx="0" cy="900000"/>
+          <a:xfrm flipV="1">
+            <a:off x="4827027" y="2490493"/>
+            <a:ext cx="0" cy="938506"/>
           </a:xfrm>
           <a:prstGeom prst="straightConnector1">
             <a:avLst/>
@@ -7277,7 +7330,7 @@
         </p:nvSpPr>
         <p:spPr>
           <a:xfrm>
-            <a:off x="4815974" y="3693140"/>
+            <a:off x="4811640" y="2783077"/>
             <a:ext cx="1566454" cy="369332"/>
           </a:xfrm>
           <a:prstGeom prst="rect">
@@ -7376,41 +7429,25 @@
         <p:spPr>
           <a:xfrm>
             <a:off x="4815974" y="2490788"/>
-            <a:ext cx="3626938" cy="0"/>
+            <a:ext cx="3642507" cy="0"/>
           </a:xfrm>
           <a:prstGeom prst="straightConnector1">
             <a:avLst/>
           </a:prstGeom>
           <a:ln w="38100">
-            <a:gradFill>
-              <a:gsLst>
-                <a:gs pos="80000">
-                  <a:srgbClr val="765093"/>
-                </a:gs>
-                <a:gs pos="0">
-                  <a:srgbClr val="7030A0"/>
-                </a:gs>
-                <a:gs pos="100000">
-                  <a:schemeClr val="bg1">
-                    <a:lumMod val="50000"/>
-                  </a:schemeClr>
-                </a:gs>
-              </a:gsLst>
-              <a:lin ang="0" scaled="0"/>
-            </a:gradFill>
             <a:headEnd type="none" w="med" len="med"/>
             <a:tailEnd type="none" w="med" len="med"/>
           </a:ln>
         </p:spPr>
         <p:style>
           <a:lnRef idx="3">
-            <a:schemeClr val="accent6"/>
+            <a:schemeClr val="accent3"/>
           </a:lnRef>
           <a:fillRef idx="0">
-            <a:schemeClr val="accent6"/>
+            <a:schemeClr val="accent3"/>
           </a:fillRef>
           <a:effectRef idx="2">
-            <a:schemeClr val="accent6"/>
+            <a:schemeClr val="accent3"/>
           </a:effectRef>
           <a:fontRef idx="minor">
             <a:schemeClr val="tx1"/>
@@ -7431,7 +7468,7 @@
         </p:nvSpPr>
         <p:spPr>
           <a:xfrm>
-            <a:off x="6021888" y="2129988"/>
+            <a:off x="6065222" y="3932783"/>
             <a:ext cx="1282723" cy="369332"/>
           </a:xfrm>
           <a:prstGeom prst="rect">
@@ -7484,6 +7521,9 @@
             <a:avLst/>
           </a:prstGeom>
           <a:ln w="38100">
+            <a:solidFill>
+              <a:srgbClr val="7030A0"/>
+            </a:solidFill>
             <a:headEnd type="none" w="med" len="med"/>
             <a:tailEnd type="none" w="med" len="med"/>
           </a:ln>

</xml_diff>

<commit_message>
efficientnet training adversarial attack
</commit_message>
<xml_diff>
--- a/fig/演示文稿1.pptx
+++ b/fig/演示文稿1.pptx
@@ -260,7 +260,7 @@
           <a:p>
             <a:fld id="{8F27BD3B-15C5-4116-87CF-B26CBD3233A6}" type="datetimeFigureOut">
               <a:rPr lang="zh-CN" altLang="en-US" smtClean="0"/>
-              <a:t>2020/1/27</a:t>
+              <a:t>2020/1/30</a:t>
             </a:fld>
             <a:endParaRPr lang="zh-CN" altLang="en-US"/>
           </a:p>
@@ -458,7 +458,7 @@
           <a:p>
             <a:fld id="{8F27BD3B-15C5-4116-87CF-B26CBD3233A6}" type="datetimeFigureOut">
               <a:rPr lang="zh-CN" altLang="en-US" smtClean="0"/>
-              <a:t>2020/1/27</a:t>
+              <a:t>2020/1/30</a:t>
             </a:fld>
             <a:endParaRPr lang="zh-CN" altLang="en-US"/>
           </a:p>
@@ -666,7 +666,7 @@
           <a:p>
             <a:fld id="{8F27BD3B-15C5-4116-87CF-B26CBD3233A6}" type="datetimeFigureOut">
               <a:rPr lang="zh-CN" altLang="en-US" smtClean="0"/>
-              <a:t>2020/1/27</a:t>
+              <a:t>2020/1/30</a:t>
             </a:fld>
             <a:endParaRPr lang="zh-CN" altLang="en-US"/>
           </a:p>
@@ -864,7 +864,7 @@
           <a:p>
             <a:fld id="{8F27BD3B-15C5-4116-87CF-B26CBD3233A6}" type="datetimeFigureOut">
               <a:rPr lang="zh-CN" altLang="en-US" smtClean="0"/>
-              <a:t>2020/1/27</a:t>
+              <a:t>2020/1/30</a:t>
             </a:fld>
             <a:endParaRPr lang="zh-CN" altLang="en-US"/>
           </a:p>
@@ -1139,7 +1139,7 @@
           <a:p>
             <a:fld id="{8F27BD3B-15C5-4116-87CF-B26CBD3233A6}" type="datetimeFigureOut">
               <a:rPr lang="zh-CN" altLang="en-US" smtClean="0"/>
-              <a:t>2020/1/27</a:t>
+              <a:t>2020/1/30</a:t>
             </a:fld>
             <a:endParaRPr lang="zh-CN" altLang="en-US"/>
           </a:p>
@@ -1404,7 +1404,7 @@
           <a:p>
             <a:fld id="{8F27BD3B-15C5-4116-87CF-B26CBD3233A6}" type="datetimeFigureOut">
               <a:rPr lang="zh-CN" altLang="en-US" smtClean="0"/>
-              <a:t>2020/1/27</a:t>
+              <a:t>2020/1/30</a:t>
             </a:fld>
             <a:endParaRPr lang="zh-CN" altLang="en-US"/>
           </a:p>
@@ -1816,7 +1816,7 @@
           <a:p>
             <a:fld id="{8F27BD3B-15C5-4116-87CF-B26CBD3233A6}" type="datetimeFigureOut">
               <a:rPr lang="zh-CN" altLang="en-US" smtClean="0"/>
-              <a:t>2020/1/27</a:t>
+              <a:t>2020/1/30</a:t>
             </a:fld>
             <a:endParaRPr lang="zh-CN" altLang="en-US"/>
           </a:p>
@@ -1957,7 +1957,7 @@
           <a:p>
             <a:fld id="{8F27BD3B-15C5-4116-87CF-B26CBD3233A6}" type="datetimeFigureOut">
               <a:rPr lang="zh-CN" altLang="en-US" smtClean="0"/>
-              <a:t>2020/1/27</a:t>
+              <a:t>2020/1/30</a:t>
             </a:fld>
             <a:endParaRPr lang="zh-CN" altLang="en-US"/>
           </a:p>
@@ -2070,7 +2070,7 @@
           <a:p>
             <a:fld id="{8F27BD3B-15C5-4116-87CF-B26CBD3233A6}" type="datetimeFigureOut">
               <a:rPr lang="zh-CN" altLang="en-US" smtClean="0"/>
-              <a:t>2020/1/27</a:t>
+              <a:t>2020/1/30</a:t>
             </a:fld>
             <a:endParaRPr lang="zh-CN" altLang="en-US"/>
           </a:p>
@@ -2381,7 +2381,7 @@
           <a:p>
             <a:fld id="{8F27BD3B-15C5-4116-87CF-B26CBD3233A6}" type="datetimeFigureOut">
               <a:rPr lang="zh-CN" altLang="en-US" smtClean="0"/>
-              <a:t>2020/1/27</a:t>
+              <a:t>2020/1/30</a:t>
             </a:fld>
             <a:endParaRPr lang="zh-CN" altLang="en-US"/>
           </a:p>
@@ -2669,7 +2669,7 @@
           <a:p>
             <a:fld id="{8F27BD3B-15C5-4116-87CF-B26CBD3233A6}" type="datetimeFigureOut">
               <a:rPr lang="zh-CN" altLang="en-US" smtClean="0"/>
-              <a:t>2020/1/27</a:t>
+              <a:t>2020/1/30</a:t>
             </a:fld>
             <a:endParaRPr lang="zh-CN" altLang="en-US"/>
           </a:p>
@@ -2910,7 +2910,7 @@
           <a:p>
             <a:fld id="{8F27BD3B-15C5-4116-87CF-B26CBD3233A6}" type="datetimeFigureOut">
               <a:rPr lang="zh-CN" altLang="en-US" smtClean="0"/>
-              <a:t>2020/1/27</a:t>
+              <a:t>2020/1/30</a:t>
             </a:fld>
             <a:endParaRPr lang="zh-CN" altLang="en-US"/>
           </a:p>
@@ -3805,8 +3805,8 @@
             </p:nvSpPr>
             <p:spPr>
               <a:xfrm>
-                <a:off x="1344144" y="357194"/>
-                <a:ext cx="2328458" cy="540020"/>
+                <a:off x="1372136" y="556404"/>
+                <a:ext cx="2378280" cy="480068"/>
               </a:xfrm>
               <a:prstGeom prst="rect">
                 <a:avLst/>
@@ -3829,22 +3829,108 @@
                       <m:sSub>
                         <m:sSubPr>
                           <m:ctrlPr>
-                            <a:rPr lang="en-US" altLang="zh-CN" b="0" i="1" smtClean="0">
+                            <a:rPr lang="en-US" altLang="zh-CN" sz="1600" b="0" i="1" smtClean="0">
                               <a:latin typeface="Cambria Math" panose="02040503050406030204" pitchFamily="18" charset="0"/>
                             </a:rPr>
                           </m:ctrlPr>
                         </m:sSubPr>
                         <m:e>
                           <m:r>
-                            <a:rPr lang="en-US" altLang="zh-CN" b="0" i="1" smtClean="0">
+                            <a:rPr lang="en-US" altLang="zh-CN" sz="1600" b="0" i="1" smtClean="0">
                               <a:latin typeface="Cambria Math" panose="02040503050406030204" pitchFamily="18" charset="0"/>
                             </a:rPr>
-                            <m:t>𝜃</m:t>
+                            <m:t>𝑤</m:t>
                           </m:r>
                         </m:e>
                         <m:sub>
                           <m:r>
-                            <a:rPr lang="en-US" altLang="zh-CN" b="0" i="1" smtClean="0">
+                            <a:rPr lang="en-US" altLang="zh-CN" sz="1600" b="0" i="1" smtClean="0">
+                              <a:latin typeface="Cambria Math" panose="02040503050406030204" pitchFamily="18" charset="0"/>
+                            </a:rPr>
+                            <m:t>𝑡</m:t>
+                          </m:r>
+                          <m:r>
+                            <a:rPr lang="en-US" altLang="zh-CN" sz="1600" b="0" i="1" smtClean="0">
+                              <a:latin typeface="Cambria Math" panose="02040503050406030204" pitchFamily="18" charset="0"/>
+                            </a:rPr>
+                            <m:t>+1</m:t>
+                          </m:r>
+                        </m:sub>
+                      </m:sSub>
+                      <m:r>
+                        <a:rPr lang="en-US" altLang="zh-CN" sz="1600" b="0" i="1" smtClean="0">
+                          <a:latin typeface="Cambria Math" panose="02040503050406030204" pitchFamily="18" charset="0"/>
+                        </a:rPr>
+                        <m:t>=</m:t>
+                      </m:r>
+                      <m:sSub>
+                        <m:sSubPr>
+                          <m:ctrlPr>
+                            <a:rPr lang="en-US" altLang="zh-CN" sz="1600" b="0" i="1" smtClean="0">
+                              <a:latin typeface="Cambria Math" panose="02040503050406030204" pitchFamily="18" charset="0"/>
+                            </a:rPr>
+                          </m:ctrlPr>
+                        </m:sSubPr>
+                        <m:e>
+                          <m:acc>
+                            <m:accPr>
+                              <m:chr m:val="̂"/>
+                              <m:ctrlPr>
+                                <a:rPr lang="en-US" altLang="zh-CN" sz="1600" i="1">
+                                  <a:latin typeface="Cambria Math" panose="02040503050406030204" pitchFamily="18" charset="0"/>
+                                </a:rPr>
+                              </m:ctrlPr>
+                            </m:accPr>
+                            <m:e>
+                              <m:r>
+                                <a:rPr lang="en-US" altLang="zh-CN" sz="1600" b="0" i="1" smtClean="0">
+                                  <a:latin typeface="Cambria Math" panose="02040503050406030204" pitchFamily="18" charset="0"/>
+                                </a:rPr>
+                                <m:t>𝑤</m:t>
+                              </m:r>
+                            </m:e>
+                          </m:acc>
+                        </m:e>
+                        <m:sub>
+                          <m:r>
+                            <a:rPr lang="en-US" altLang="zh-CN" sz="1600" b="0" i="1" smtClean="0">
+                              <a:latin typeface="Cambria Math" panose="02040503050406030204" pitchFamily="18" charset="0"/>
+                            </a:rPr>
+                            <m:t>𝑡</m:t>
+                          </m:r>
+                          <m:r>
+                            <a:rPr lang="en-US" altLang="zh-CN" sz="1600" b="0" i="1" smtClean="0">
+                              <a:latin typeface="Cambria Math" panose="02040503050406030204" pitchFamily="18" charset="0"/>
+                            </a:rPr>
+                            <m:t>+1</m:t>
+                          </m:r>
+                        </m:sub>
+                      </m:sSub>
+                      <m:r>
+                        <a:rPr lang="en-US" altLang="zh-CN" sz="1600" b="0" i="1" smtClean="0">
+                          <a:latin typeface="Cambria Math" panose="02040503050406030204" pitchFamily="18" charset="0"/>
+                        </a:rPr>
+                        <m:t>=</m:t>
+                      </m:r>
+                      <m:sSub>
+                        <m:sSubPr>
+                          <m:ctrlPr>
+                            <a:rPr lang="en-US" altLang="zh-CN" sz="1600" b="0" i="1" smtClean="0">
+                              <a:latin typeface="Cambria Math" panose="02040503050406030204" pitchFamily="18" charset="0"/>
+                            </a:rPr>
+                          </m:ctrlPr>
+                        </m:sSubPr>
+                        <m:e>
+                          <m:r>
+                            <a:rPr lang="en-US" altLang="zh-CN" sz="1600" b="0" i="1" smtClean="0">
+                              <a:latin typeface="Cambria Math" panose="02040503050406030204" pitchFamily="18" charset="0"/>
+                            </a:rPr>
+                            <m:t>𝑤</m:t>
+                          </m:r>
+                        </m:e>
+                        <m:sub>
+                          <m:r>
+                            <a:rPr lang="en-US" altLang="zh-CN" sz="1600" b="0" i="1" smtClean="0">
                               <a:latin typeface="Cambria Math" panose="02040503050406030204" pitchFamily="18" charset="0"/>
                             </a:rPr>
                             <m:t>𝑡</m:t>
@@ -3852,93 +3938,13 @@
                         </m:sub>
                       </m:sSub>
                       <m:r>
-                        <a:rPr lang="en-US" altLang="zh-CN" b="0" i="1" smtClean="0">
-                          <a:latin typeface="Cambria Math" panose="02040503050406030204" pitchFamily="18" charset="0"/>
-                        </a:rPr>
-                        <m:t>=</m:t>
-                      </m:r>
-                      <m:acc>
-                        <m:accPr>
-                          <m:chr m:val="̂"/>
-                          <m:ctrlPr>
-                            <a:rPr lang="en-US" altLang="zh-CN" b="0" i="1" smtClean="0">
-                              <a:latin typeface="Cambria Math" panose="02040503050406030204" pitchFamily="18" charset="0"/>
-                            </a:rPr>
-                          </m:ctrlPr>
-                        </m:accPr>
-                        <m:e>
-                          <m:sSub>
-                            <m:sSubPr>
-                              <m:ctrlPr>
-                                <a:rPr lang="en-US" altLang="zh-CN" b="0" i="1" smtClean="0">
-                                  <a:latin typeface="Cambria Math" panose="02040503050406030204" pitchFamily="18" charset="0"/>
-                                </a:rPr>
-                              </m:ctrlPr>
-                            </m:sSubPr>
-                            <m:e>
-                              <m:r>
-                                <a:rPr lang="en-US" altLang="zh-CN" b="0" i="1" smtClean="0">
-                                  <a:latin typeface="Cambria Math" panose="02040503050406030204" pitchFamily="18" charset="0"/>
-                                </a:rPr>
-                                <m:t>𝜃</m:t>
-                              </m:r>
-                            </m:e>
-                            <m:sub>
-                              <m:r>
-                                <a:rPr lang="en-US" altLang="zh-CN" b="0" i="1" smtClean="0">
-                                  <a:latin typeface="Cambria Math" panose="02040503050406030204" pitchFamily="18" charset="0"/>
-                                </a:rPr>
-                                <m:t>𝑡</m:t>
-                              </m:r>
-                            </m:sub>
-                          </m:sSub>
-                        </m:e>
-                      </m:acc>
-                      <m:r>
-                        <a:rPr lang="en-US" altLang="zh-CN" b="0" i="1" smtClean="0">
-                          <a:latin typeface="Cambria Math" panose="02040503050406030204" pitchFamily="18" charset="0"/>
-                        </a:rPr>
-                        <m:t>=</m:t>
-                      </m:r>
-                      <m:sSub>
-                        <m:sSubPr>
-                          <m:ctrlPr>
-                            <a:rPr lang="en-US" altLang="zh-CN" b="0" i="1" smtClean="0">
-                              <a:latin typeface="Cambria Math" panose="02040503050406030204" pitchFamily="18" charset="0"/>
-                            </a:rPr>
-                          </m:ctrlPr>
-                        </m:sSubPr>
-                        <m:e>
-                          <m:r>
-                            <a:rPr lang="en-US" altLang="zh-CN" b="0" i="1" smtClean="0">
-                              <a:latin typeface="Cambria Math" panose="02040503050406030204" pitchFamily="18" charset="0"/>
-                            </a:rPr>
-                            <m:t>𝜃</m:t>
-                          </m:r>
-                        </m:e>
-                        <m:sub>
-                          <m:r>
-                            <a:rPr lang="en-US" altLang="zh-CN" b="0" i="1" smtClean="0">
-                              <a:latin typeface="Cambria Math" panose="02040503050406030204" pitchFamily="18" charset="0"/>
-                            </a:rPr>
-                            <m:t>𝑡</m:t>
-                          </m:r>
-                          <m:r>
-                            <a:rPr lang="en-US" altLang="zh-CN" b="0" i="1" smtClean="0">
-                              <a:latin typeface="Cambria Math" panose="02040503050406030204" pitchFamily="18" charset="0"/>
-                            </a:rPr>
-                            <m:t>−1</m:t>
-                          </m:r>
-                        </m:sub>
-                      </m:sSub>
-                      <m:r>
-                        <a:rPr lang="en-US" altLang="zh-CN" b="0" i="1" smtClean="0">
+                        <a:rPr lang="en-US" altLang="zh-CN" sz="1600" b="0" i="1" smtClean="0">
                           <a:latin typeface="Cambria Math" panose="02040503050406030204" pitchFamily="18" charset="0"/>
                         </a:rPr>
                         <m:t>−</m:t>
                       </m:r>
                       <m:r>
-                        <a:rPr lang="en-US" altLang="zh-CN" b="0" i="1" smtClean="0">
+                        <a:rPr lang="en-US" altLang="zh-CN" sz="1600" b="0" i="1" smtClean="0">
                           <a:latin typeface="Cambria Math" panose="02040503050406030204" pitchFamily="18" charset="0"/>
                           <a:ea typeface="Cambria Math" panose="02040503050406030204" pitchFamily="18" charset="0"/>
                         </a:rPr>
@@ -3947,7 +3953,7 @@
                       <m:f>
                         <m:fPr>
                           <m:ctrlPr>
-                            <a:rPr lang="en-US" altLang="zh-CN" b="1" i="1" smtClean="0">
+                            <a:rPr lang="en-US" altLang="zh-CN" sz="1600" b="1" i="1" smtClean="0">
                               <a:solidFill>
                                 <a:schemeClr val="accent5"/>
                               </a:solidFill>
@@ -3959,7 +3965,7 @@
                           <m:sSub>
                             <m:sSubPr>
                               <m:ctrlPr>
-                                <a:rPr lang="en-US" altLang="zh-CN" b="1" i="1" smtClean="0">
+                                <a:rPr lang="en-US" altLang="zh-CN" sz="1600" b="1" i="1" smtClean="0">
                                   <a:solidFill>
                                     <a:schemeClr val="accent5"/>
                                   </a:solidFill>
@@ -3969,7 +3975,7 @@
                             </m:sSubPr>
                             <m:e>
                               <m:r>
-                                <a:rPr lang="en-US" altLang="zh-CN" b="1" i="1" smtClean="0">
+                                <a:rPr lang="en-US" altLang="zh-CN" sz="1600" b="1" i="1" smtClean="0">
                                   <a:solidFill>
                                     <a:schemeClr val="accent5"/>
                                   </a:solidFill>
@@ -3980,7 +3986,7 @@
                             </m:e>
                             <m:sub>
                               <m:r>
-                                <a:rPr lang="en-US" altLang="zh-CN" b="1" i="1" smtClean="0">
+                                <a:rPr lang="en-US" altLang="zh-CN" sz="1600" b="1" i="1" smtClean="0">
                                   <a:solidFill>
                                     <a:schemeClr val="accent5"/>
                                   </a:solidFill>
@@ -3996,7 +4002,7 @@
                             <m:radPr>
                               <m:degHide m:val="on"/>
                               <m:ctrlPr>
-                                <a:rPr lang="en-US" altLang="zh-CN" b="1" i="1" smtClean="0">
+                                <a:rPr lang="en-US" altLang="zh-CN" sz="1600" b="1" i="1" smtClean="0">
                                   <a:solidFill>
                                     <a:schemeClr val="accent5"/>
                                   </a:solidFill>
@@ -4009,7 +4015,7 @@
                               <m:sSub>
                                 <m:sSubPr>
                                   <m:ctrlPr>
-                                    <a:rPr lang="en-US" altLang="zh-CN" b="1" i="1" smtClean="0">
+                                    <a:rPr lang="en-US" altLang="zh-CN" sz="1600" b="1" i="1" smtClean="0">
                                       <a:solidFill>
                                         <a:schemeClr val="accent5"/>
                                       </a:solidFill>
@@ -4019,7 +4025,7 @@
                                 </m:sSubPr>
                                 <m:e>
                                   <m:r>
-                                    <a:rPr lang="en-US" altLang="zh-CN" b="1" i="1" smtClean="0">
+                                    <a:rPr lang="en-US" altLang="zh-CN" sz="1600" b="1" i="1" smtClean="0">
                                       <a:solidFill>
                                         <a:schemeClr val="accent5"/>
                                       </a:solidFill>
@@ -4030,7 +4036,7 @@
                                 </m:e>
                                 <m:sub>
                                   <m:r>
-                                    <a:rPr lang="en-US" altLang="zh-CN" b="1" i="1" smtClean="0">
+                                    <a:rPr lang="en-US" altLang="zh-CN" sz="1600" b="1" i="1" smtClean="0">
                                       <a:solidFill>
                                         <a:schemeClr val="accent5"/>
                                       </a:solidFill>
@@ -4047,7 +4053,7 @@
                     </m:oMath>
                   </m:oMathPara>
                 </a14:m>
-                <a:endParaRPr lang="zh-CN" altLang="en-US" b="1" dirty="0"/>
+                <a:endParaRPr lang="zh-CN" altLang="en-US" sz="1600" b="1" dirty="0"/>
               </a:p>
             </p:txBody>
           </p:sp>
@@ -4069,8 +4075,8 @@
             </p:nvSpPr>
             <p:spPr>
               <a:xfrm>
-                <a:off x="1344144" y="357194"/>
-                <a:ext cx="2328458" cy="540020"/>
+                <a:off x="1372136" y="556404"/>
+                <a:ext cx="2378280" cy="480068"/>
               </a:xfrm>
               <a:prstGeom prst="rect">
                 <a:avLst/>
@@ -4078,7 +4084,7 @@
               <a:blipFill>
                 <a:blip r:embed="rId2"/>
                 <a:stretch>
-                  <a:fillRect l="-1630" b="-2273"/>
+                  <a:fillRect l="-535" b="-2564"/>
                 </a:stretch>
               </a:blipFill>
             </p:spPr>
@@ -4566,7 +4572,7 @@
             <p:spPr>
               <a:xfrm>
                 <a:off x="3911520" y="2588733"/>
-                <a:ext cx="3199839" cy="577466"/>
+                <a:ext cx="3761127" cy="553998"/>
               </a:xfrm>
               <a:prstGeom prst="rect">
                 <a:avLst/>
@@ -4583,23 +4589,23 @@
                 <a14:m>
                   <m:oMathPara xmlns:m="http://schemas.openxmlformats.org/officeDocument/2006/math">
                     <m:oMathParaPr>
-                      <m:jc m:val="centerGroup"/>
+                      <m:jc m:val="left"/>
                     </m:oMathParaPr>
                     <m:oMath xmlns:m="http://schemas.openxmlformats.org/officeDocument/2006/math">
                       <m:sSub>
                         <m:sSubPr>
                           <m:ctrlPr>
-                            <a:rPr lang="en-US" i="1">
+                            <a:rPr lang="en-US" i="1" smtClean="0">
                               <a:latin typeface="Cambria Math" panose="02040503050406030204" pitchFamily="18" charset="0"/>
                             </a:rPr>
                           </m:ctrlPr>
                         </m:sSubPr>
                         <m:e>
                           <m:r>
-                            <a:rPr lang="en-US" i="1">
+                            <a:rPr lang="en-US" b="0" i="1" smtClean="0">
                               <a:latin typeface="Cambria Math" panose="02040503050406030204" pitchFamily="18" charset="0"/>
                             </a:rPr>
-                            <m:t>𝜃</m:t>
+                            <m:t>𝑤</m:t>
                           </m:r>
                         </m:e>
                         <m:sub>
@@ -4608,6 +4614,12 @@
                               <a:latin typeface="Cambria Math" panose="02040503050406030204" pitchFamily="18" charset="0"/>
                             </a:rPr>
                             <m:t>𝑡</m:t>
+                          </m:r>
+                          <m:r>
+                            <a:rPr lang="en-US" b="0" i="1" smtClean="0">
+                              <a:latin typeface="Cambria Math" panose="02040503050406030204" pitchFamily="18" charset="0"/>
+                            </a:rPr>
+                            <m:t>+1</m:t>
                           </m:r>
                         </m:sub>
                       </m:sSub>
@@ -4693,10 +4705,10 @@
                             </m:accPr>
                             <m:e>
                               <m:r>
-                                <a:rPr lang="en-US" i="1">
+                                <a:rPr lang="en-US" b="0" i="1" smtClean="0">
                                   <a:latin typeface="Cambria Math" panose="02040503050406030204" pitchFamily="18" charset="0"/>
                                 </a:rPr>
-                                <m:t>𝜃</m:t>
+                                <m:t>𝑤</m:t>
                               </m:r>
                             </m:e>
                           </m:acc>
@@ -4707,6 +4719,12 @@
                               <a:latin typeface="Cambria Math" panose="02040503050406030204" pitchFamily="18" charset="0"/>
                             </a:rPr>
                             <m:t>𝑡</m:t>
+                          </m:r>
+                          <m:r>
+                            <a:rPr lang="en-US" b="0" i="1" smtClean="0">
+                              <a:latin typeface="Cambria Math" panose="02040503050406030204" pitchFamily="18" charset="0"/>
+                            </a:rPr>
+                            <m:t>+1</m:t>
                           </m:r>
                         </m:sub>
                       </m:sSub>
@@ -4741,10 +4759,10 @@
                             </m:accPr>
                             <m:e>
                               <m:r>
-                                <a:rPr lang="en-US" i="1">
+                                <a:rPr lang="en-US" b="0" i="1" smtClean="0">
                                   <a:latin typeface="Cambria Math" panose="02040503050406030204" pitchFamily="18" charset="0"/>
                                 </a:rPr>
-                                <m:t>𝜃</m:t>
+                                <m:t>𝑤</m:t>
                               </m:r>
                             </m:e>
                           </m:acc>
@@ -4755,6 +4773,12 @@
                               <a:latin typeface="Cambria Math" panose="02040503050406030204" pitchFamily="18" charset="0"/>
                             </a:rPr>
                             <m:t>𝑡</m:t>
+                          </m:r>
+                          <m:r>
+                            <a:rPr lang="en-US" b="0" i="1" smtClean="0">
+                              <a:latin typeface="Cambria Math" panose="02040503050406030204" pitchFamily="18" charset="0"/>
+                            </a:rPr>
+                            <m:t>+1</m:t>
                           </m:r>
                         </m:sub>
                       </m:sSub>
@@ -4834,10 +4858,10 @@
                             </m:accPr>
                             <m:e>
                               <m:r>
-                                <a:rPr lang="en-US" i="1">
+                                <a:rPr lang="en-US" b="0" i="1" smtClean="0">
                                   <a:latin typeface="Cambria Math" panose="02040503050406030204" pitchFamily="18" charset="0"/>
                                 </a:rPr>
-                                <m:t>𝜃</m:t>
+                                <m:t>𝑤</m:t>
                               </m:r>
                             </m:e>
                           </m:acc>
@@ -4848,6 +4872,12 @@
                               <a:latin typeface="Cambria Math" panose="02040503050406030204" pitchFamily="18" charset="0"/>
                             </a:rPr>
                             <m:t>𝑡</m:t>
+                          </m:r>
+                          <m:r>
+                            <a:rPr lang="en-US" b="0" i="1" smtClean="0">
+                              <a:latin typeface="Cambria Math" panose="02040503050406030204" pitchFamily="18" charset="0"/>
+                            </a:rPr>
+                            <m:t>+1</m:t>
                           </m:r>
                         </m:sub>
                       </m:sSub>
@@ -4883,7 +4913,7 @@
             <p:spPr>
               <a:xfrm>
                 <a:off x="3911520" y="2588733"/>
-                <a:ext cx="3199839" cy="577466"/>
+                <a:ext cx="3761127" cy="553998"/>
               </a:xfrm>
               <a:prstGeom prst="rect">
                 <a:avLst/>
@@ -4891,7 +4921,7 @@
               <a:blipFill>
                 <a:blip r:embed="rId5"/>
                 <a:stretch>
-                  <a:fillRect t="-13333" b="-15556"/>
+                  <a:fillRect l="-1347" t="-9302" b="-16279"/>
                 </a:stretch>
               </a:blipFill>
             </p:spPr>
@@ -4910,8 +4940,8 @@
           </p:sp>
         </mc:Fallback>
       </mc:AlternateContent>
-      <mc:AlternateContent xmlns:mc="http://schemas.openxmlformats.org/markup-compatibility/2006" xmlns:a14="http://schemas.microsoft.com/office/drawing/2010/main">
-        <mc:Choice Requires="a14">
+      <mc:AlternateContent xmlns:mc="http://schemas.openxmlformats.org/markup-compatibility/2006">
+        <mc:Choice xmlns:a14="http://schemas.microsoft.com/office/drawing/2010/main" Requires="a14">
           <p:sp>
             <p:nvSpPr>
               <p:cNvPr id="75" name="矩形 74">
@@ -4927,7 +4957,7 @@
             <p:spPr>
               <a:xfrm>
                 <a:off x="5374374" y="3204627"/>
-                <a:ext cx="2079223" cy="632353"/>
+                <a:ext cx="2350708" cy="632353"/>
               </a:xfrm>
               <a:prstGeom prst="rect">
                 <a:avLst/>
@@ -4969,7 +4999,7 @@
                                 <a:rPr lang="en-US" altLang="zh-CN" b="0" i="1" smtClean="0">
                                   <a:latin typeface="Cambria Math" panose="02040503050406030204" pitchFamily="18" charset="0"/>
                                 </a:rPr>
-                                <m:t>𝜃</m:t>
+                                <m:t>𝑤</m:t>
                               </m:r>
                             </m:e>
                           </m:acc>
@@ -4980,6 +5010,12 @@
                               <a:latin typeface="Cambria Math" panose="02040503050406030204" pitchFamily="18" charset="0"/>
                             </a:rPr>
                             <m:t>𝑡</m:t>
+                          </m:r>
+                          <m:r>
+                            <a:rPr lang="en-US" altLang="zh-CN" b="0" i="1" smtClean="0">
+                              <a:latin typeface="Cambria Math" panose="02040503050406030204" pitchFamily="18" charset="0"/>
+                            </a:rPr>
+                            <m:t>+1</m:t>
                           </m:r>
                         </m:sub>
                       </m:sSub>
@@ -5002,7 +5038,7 @@
                             <a:rPr lang="en-US" altLang="zh-CN" b="0" i="1" smtClean="0">
                               <a:latin typeface="Cambria Math" panose="02040503050406030204" pitchFamily="18" charset="0"/>
                             </a:rPr>
-                            <m:t>𝜃</m:t>
+                            <m:t>𝑤</m:t>
                           </m:r>
                         </m:e>
                         <m:sub>
@@ -5029,7 +5065,7 @@
                       <m:r>
                         <a:rPr lang="en-US" altLang="zh-CN" b="1" i="1" smtClean="0">
                           <a:solidFill>
-                            <a:schemeClr val="accent5"/>
+                            <a:schemeClr val="tx1"/>
                           </a:solidFill>
                           <a:latin typeface="Cambria Math" panose="02040503050406030204" pitchFamily="18" charset="0"/>
                           <a:ea typeface="Cambria Math" panose="02040503050406030204" pitchFamily="18" charset="0"/>
@@ -5144,7 +5180,7 @@
             </p:txBody>
           </p:sp>
         </mc:Choice>
-        <mc:Fallback xmlns="">
+        <mc:Fallback>
           <p:sp>
             <p:nvSpPr>
               <p:cNvPr id="75" name="矩形 74">
@@ -5162,7 +5198,7 @@
             <p:spPr>
               <a:xfrm>
                 <a:off x="5374374" y="3204627"/>
-                <a:ext cx="2079223" cy="632353"/>
+                <a:ext cx="2350708" cy="632353"/>
               </a:xfrm>
               <a:prstGeom prst="rect">
                 <a:avLst/>
@@ -5414,8 +5450,8 @@
           </a:fontRef>
         </p:style>
       </p:cxnSp>
-      <mc:AlternateContent xmlns:mc="http://schemas.openxmlformats.org/markup-compatibility/2006" xmlns:a14="http://schemas.microsoft.com/office/drawing/2010/main">
-        <mc:Choice Requires="a14">
+      <mc:AlternateContent xmlns:mc="http://schemas.openxmlformats.org/markup-compatibility/2006">
+        <mc:Choice xmlns:a14="http://schemas.microsoft.com/office/drawing/2010/main" Requires="a14">
           <p:sp>
             <p:nvSpPr>
               <p:cNvPr id="86" name="文本框 79">
@@ -5431,7 +5467,7 @@
             <p:spPr>
               <a:xfrm>
                 <a:off x="4064789" y="409642"/>
-                <a:ext cx="4402417" cy="991938"/>
+                <a:ext cx="4402417" cy="968470"/>
               </a:xfrm>
               <a:prstGeom prst="rect">
                 <a:avLst/>
@@ -5467,21 +5503,21 @@
                       </m:sSubPr>
                       <m:e>
                         <m:r>
-                          <a:rPr lang="en-US" sz="1800" i="1" kern="1200">
+                          <a:rPr lang="en-US" altLang="zh-CN" sz="1800" b="0" i="1" kern="1200" smtClean="0">
                             <a:solidFill>
                               <a:srgbClr val="000000"/>
                             </a:solidFill>
                             <a:effectLst/>
                             <a:latin typeface="Cambria Math" panose="02040503050406030204" pitchFamily="18" charset="0"/>
-                            <a:ea typeface="等线" panose="02010600030101010101" pitchFamily="2" charset="-122"/>
+                            <a:ea typeface="Cambria Math" panose="02040503050406030204" pitchFamily="18" charset="0"/>
                             <a:cs typeface="Times New Roman" panose="02020603050405020304" pitchFamily="18" charset="0"/>
                           </a:rPr>
-                          <m:t>𝜃</m:t>
+                          <m:t>𝑤</m:t>
                         </m:r>
                       </m:e>
                       <m:sub>
                         <m:r>
-                          <a:rPr lang="en-US" sz="1800" i="1" kern="1200">
+                          <a:rPr lang="en-US" sz="1800" b="0" i="1" kern="1200" smtClean="0">
                             <a:solidFill>
                               <a:srgbClr val="000000"/>
                             </a:solidFill>
@@ -5491,6 +5527,18 @@
                             <a:cs typeface="Times New Roman" panose="02020603050405020304" pitchFamily="18" charset="0"/>
                           </a:rPr>
                           <m:t>𝑡</m:t>
+                        </m:r>
+                        <m:r>
+                          <a:rPr lang="en-US" sz="1800" b="0" i="1" kern="1200" smtClean="0">
+                            <a:solidFill>
+                              <a:srgbClr val="000000"/>
+                            </a:solidFill>
+                            <a:effectLst/>
+                            <a:latin typeface="Cambria Math" panose="02040503050406030204" pitchFamily="18" charset="0"/>
+                            <a:ea typeface="等线" panose="02010600030101010101" pitchFamily="2" charset="-122"/>
+                            <a:cs typeface="Times New Roman" panose="02020603050405020304" pitchFamily="18" charset="0"/>
+                          </a:rPr>
+                          <m:t>+1</m:t>
                         </m:r>
                       </m:sub>
                     </m:sSub>
@@ -5525,16 +5573,16 @@
                       </m:sSubPr>
                       <m:e>
                         <m:r>
-                          <a:rPr lang="en-US" sz="1800" i="1" kern="1200">
+                          <a:rPr lang="en-US" altLang="zh-CN" sz="1800" b="0" i="1" kern="1200" smtClean="0">
                             <a:solidFill>
                               <a:srgbClr val="000000"/>
                             </a:solidFill>
                             <a:effectLst/>
                             <a:latin typeface="Cambria Math" panose="02040503050406030204" pitchFamily="18" charset="0"/>
-                            <a:ea typeface="等线" panose="02010600030101010101" pitchFamily="2" charset="-122"/>
+                            <a:ea typeface="Cambria Math" panose="02040503050406030204" pitchFamily="18" charset="0"/>
                             <a:cs typeface="Times New Roman" panose="02020603050405020304" pitchFamily="18" charset="0"/>
                           </a:rPr>
-                          <m:t>𝜃</m:t>
+                          <m:t>𝑤</m:t>
                         </m:r>
                       </m:e>
                       <m:sub>
@@ -5549,18 +5597,6 @@
                             <a:cs typeface="Times New Roman" panose="02020603050405020304" pitchFamily="18" charset="0"/>
                           </a:rPr>
                           <m:t>𝑡</m:t>
-                        </m:r>
-                        <m:r>
-                          <a:rPr lang="en-US" sz="1800" i="1" kern="1200">
-                            <a:solidFill>
-                              <a:srgbClr val="000000"/>
-                            </a:solidFill>
-                            <a:effectLst/>
-                            <a:latin typeface="Cambria Math" panose="02040503050406030204" pitchFamily="18" charset="0"/>
-                            <a:ea typeface="等线" panose="02010600030101010101" pitchFamily="2" charset="-122"/>
-                            <a:cs typeface="Times New Roman" panose="02020603050405020304" pitchFamily="18" charset="0"/>
-                          </a:rPr>
-                          <m:t>−1</m:t>
                         </m:r>
                       </m:sub>
                     </m:sSub>
@@ -5579,7 +5615,7 @@
                     <m:r>
                       <a:rPr lang="en-US" sz="1800" b="1" i="1" kern="1200" smtClean="0">
                         <a:solidFill>
-                          <a:srgbClr val="5B9BD5"/>
+                          <a:schemeClr val="tx1"/>
                         </a:solidFill>
                         <a:effectLst/>
                         <a:latin typeface="Cambria Math" panose="02040503050406030204" pitchFamily="18" charset="0"/>
@@ -5764,15 +5800,15 @@
                       </m:sSubPr>
                       <m:e>
                         <m:r>
-                          <a:rPr lang="en-US" i="1">
+                          <a:rPr lang="en-US" altLang="zh-CN" b="0" i="1" smtClean="0">
                             <a:solidFill>
                               <a:srgbClr val="000000"/>
                             </a:solidFill>
                             <a:latin typeface="Cambria Math" panose="02040503050406030204" pitchFamily="18" charset="0"/>
-                            <a:ea typeface="等线" panose="02010600030101010101" pitchFamily="2" charset="-122"/>
+                            <a:ea typeface="Cambria Math" panose="02040503050406030204" pitchFamily="18" charset="0"/>
                             <a:cs typeface="Times New Roman" panose="02020603050405020304" pitchFamily="18" charset="0"/>
                           </a:rPr>
-                          <m:t>𝜃</m:t>
+                          <m:t>𝑤</m:t>
                         </m:r>
                       </m:e>
                       <m:sub>
@@ -5786,17 +5822,6 @@
                             <a:cs typeface="Times New Roman" panose="02020603050405020304" pitchFamily="18" charset="0"/>
                           </a:rPr>
                           <m:t>𝑡</m:t>
-                        </m:r>
-                        <m:r>
-                          <a:rPr lang="en-US" i="1">
-                            <a:solidFill>
-                              <a:srgbClr val="000000"/>
-                            </a:solidFill>
-                            <a:latin typeface="Cambria Math" panose="02040503050406030204" pitchFamily="18" charset="0"/>
-                            <a:ea typeface="等线" panose="02010600030101010101" pitchFamily="2" charset="-122"/>
-                            <a:cs typeface="Times New Roman" panose="02020603050405020304" pitchFamily="18" charset="0"/>
-                          </a:rPr>
-                          <m:t>−1</m:t>
                         </m:r>
                       </m:sub>
                     </m:sSub>
@@ -5836,43 +5861,49 @@
                         </m:ctrlPr>
                       </m:dPr>
                       <m:e>
-                        <m:acc>
-                          <m:accPr>
-                            <m:chr m:val="̂"/>
+                        <m:sSub>
+                          <m:sSubPr>
                             <m:ctrlPr>
                               <a:rPr lang="en-US" altLang="zh-CN" i="1">
                                 <a:latin typeface="Cambria Math" panose="02040503050406030204" pitchFamily="18" charset="0"/>
                               </a:rPr>
                             </m:ctrlPr>
-                          </m:accPr>
+                          </m:sSubPr>
                           <m:e>
-                            <m:sSub>
-                              <m:sSubPr>
+                            <m:acc>
+                              <m:accPr>
+                                <m:chr m:val="̂"/>
                                 <m:ctrlPr>
                                   <a:rPr lang="en-US" altLang="zh-CN" i="1">
                                     <a:latin typeface="Cambria Math" panose="02040503050406030204" pitchFamily="18" charset="0"/>
                                   </a:rPr>
                                 </m:ctrlPr>
-                              </m:sSubPr>
+                              </m:accPr>
                               <m:e>
                                 <m:r>
-                                  <a:rPr lang="en-US" altLang="zh-CN" i="1">
+                                  <a:rPr lang="en-US" altLang="zh-CN" b="0" i="1" smtClean="0">
                                     <a:latin typeface="Cambria Math" panose="02040503050406030204" pitchFamily="18" charset="0"/>
                                   </a:rPr>
-                                  <m:t>𝜃</m:t>
+                                  <m:t>𝑤</m:t>
                                 </m:r>
                               </m:e>
-                              <m:sub>
-                                <m:r>
-                                  <a:rPr lang="en-US" altLang="zh-CN" i="1">
-                                    <a:latin typeface="Cambria Math" panose="02040503050406030204" pitchFamily="18" charset="0"/>
-                                  </a:rPr>
-                                  <m:t>𝑡</m:t>
-                                </m:r>
-                              </m:sub>
-                            </m:sSub>
+                            </m:acc>
                           </m:e>
-                        </m:acc>
+                          <m:sub>
+                            <m:r>
+                              <a:rPr lang="en-US" altLang="zh-CN" i="1">
+                                <a:latin typeface="Cambria Math" panose="02040503050406030204" pitchFamily="18" charset="0"/>
+                              </a:rPr>
+                              <m:t>𝑡</m:t>
+                            </m:r>
+                            <m:r>
+                              <a:rPr lang="en-US" altLang="zh-CN" b="0" i="1" smtClean="0">
+                                <a:latin typeface="Cambria Math" panose="02040503050406030204" pitchFamily="18" charset="0"/>
+                              </a:rPr>
+                              <m:t>+1</m:t>
+                            </m:r>
+                          </m:sub>
+                        </m:sSub>
                         <m:r>
                           <a:rPr lang="en-US" altLang="zh-CN" b="0" i="1" smtClean="0">
                             <a:latin typeface="Cambria Math" panose="02040503050406030204" pitchFamily="18" charset="0"/>
@@ -5889,10 +5920,10 @@
                           </m:sSubPr>
                           <m:e>
                             <m:r>
-                              <a:rPr lang="en-US" altLang="zh-CN" i="1">
+                              <a:rPr lang="en-US" altLang="zh-CN" b="0" i="1" smtClean="0">
                                 <a:latin typeface="Cambria Math" panose="02040503050406030204" pitchFamily="18" charset="0"/>
                               </a:rPr>
-                              <m:t>𝜃</m:t>
+                              <m:t>𝑤</m:t>
                             </m:r>
                           </m:e>
                           <m:sub>
@@ -5901,12 +5932,6 @@
                                 <a:latin typeface="Cambria Math" panose="02040503050406030204" pitchFamily="18" charset="0"/>
                               </a:rPr>
                               <m:t>𝑡</m:t>
-                            </m:r>
-                            <m:r>
-                              <a:rPr lang="en-US" altLang="zh-CN" i="1">
-                                <a:latin typeface="Cambria Math" panose="02040503050406030204" pitchFamily="18" charset="0"/>
-                              </a:rPr>
-                              <m:t>−1</m:t>
                             </m:r>
                           </m:sub>
                         </m:sSub>
@@ -5962,16 +5987,16 @@
                         </m:sSubPr>
                         <m:e>
                           <m:r>
-                            <a:rPr lang="en-US" sz="1800" i="1" kern="1200">
+                            <a:rPr lang="en-US" altLang="zh-CN" sz="1800" b="0" i="1" kern="1200" smtClean="0">
                               <a:solidFill>
                                 <a:srgbClr val="000000"/>
                               </a:solidFill>
                               <a:effectLst/>
                               <a:latin typeface="Cambria Math" panose="02040503050406030204" pitchFamily="18" charset="0"/>
-                              <a:ea typeface="等线" panose="02010600030101010101" pitchFamily="2" charset="-122"/>
+                              <a:ea typeface="Cambria Math" panose="02040503050406030204" pitchFamily="18" charset="0"/>
                               <a:cs typeface="Times New Roman" panose="02020603050405020304" pitchFamily="18" charset="0"/>
                             </a:rPr>
-                            <m:t>𝜃</m:t>
+                            <m:t>𝑤</m:t>
                           </m:r>
                         </m:e>
                         <m:sub>
@@ -5986,18 +6011,6 @@
                               <a:cs typeface="Times New Roman" panose="02020603050405020304" pitchFamily="18" charset="0"/>
                             </a:rPr>
                             <m:t>𝑡</m:t>
-                          </m:r>
-                          <m:r>
-                            <a:rPr lang="en-US" sz="1800" i="1" kern="1200">
-                              <a:solidFill>
-                                <a:srgbClr val="000000"/>
-                              </a:solidFill>
-                              <a:effectLst/>
-                              <a:latin typeface="Cambria Math" panose="02040503050406030204" pitchFamily="18" charset="0"/>
-                              <a:ea typeface="等线" panose="02010600030101010101" pitchFamily="2" charset="-122"/>
-                              <a:cs typeface="Times New Roman" panose="02020603050405020304" pitchFamily="18" charset="0"/>
-                            </a:rPr>
-                            <m:t>−1</m:t>
                           </m:r>
                         </m:sub>
                       </m:sSub>
@@ -6092,7 +6105,7 @@
                             <m:accPr>
                               <m:chr m:val="̂"/>
                               <m:ctrlPr>
-                                <a:rPr lang="zh-CN" altLang="zh-CN" i="1">
+                                <a:rPr lang="zh-CN" altLang="zh-CN" i="1" smtClean="0">
                                   <a:solidFill>
                                     <a:srgbClr val="000000"/>
                                   </a:solidFill>
@@ -6104,14 +6117,15 @@
                             </m:accPr>
                             <m:e>
                               <m:r>
-                                <a:rPr lang="en-US" altLang="zh-CN" i="1">
+                                <a:rPr lang="en-US" altLang="zh-CN" b="0" i="1" smtClean="0">
                                   <a:solidFill>
                                     <a:srgbClr val="000000"/>
                                   </a:solidFill>
                                   <a:latin typeface="Cambria Math" panose="02040503050406030204" pitchFamily="18" charset="0"/>
+                                  <a:ea typeface="Cambria Math" panose="02040503050406030204" pitchFamily="18" charset="0"/>
                                   <a:cs typeface="Times New Roman" panose="02020603050405020304" pitchFamily="18" charset="0"/>
                                 </a:rPr>
-                                <m:t>𝜃</m:t>
+                                <m:t>𝑤</m:t>
                               </m:r>
                             </m:e>
                           </m:acc>
@@ -6126,6 +6140,16 @@
                               <a:cs typeface="Times New Roman" panose="02020603050405020304" pitchFamily="18" charset="0"/>
                             </a:rPr>
                             <m:t>𝑡</m:t>
+                          </m:r>
+                          <m:r>
+                            <a:rPr lang="en-US" altLang="zh-CN" b="0" i="1" smtClean="0">
+                              <a:solidFill>
+                                <a:srgbClr val="000000"/>
+                              </a:solidFill>
+                              <a:latin typeface="Cambria Math" panose="02040503050406030204" pitchFamily="18" charset="0"/>
+                              <a:cs typeface="Times New Roman" panose="02020603050405020304" pitchFamily="18" charset="0"/>
+                            </a:rPr>
+                            <m:t>+1</m:t>
                           </m:r>
                         </m:sub>
                       </m:sSub>
@@ -6255,14 +6279,15 @@
                             </m:accPr>
                             <m:e>
                               <m:r>
-                                <a:rPr lang="en-US" altLang="zh-CN" i="1">
+                                <a:rPr lang="en-US" altLang="zh-CN" b="0" i="1" smtClean="0">
                                   <a:solidFill>
                                     <a:srgbClr val="000000"/>
                                   </a:solidFill>
                                   <a:latin typeface="Cambria Math" panose="02040503050406030204" pitchFamily="18" charset="0"/>
+                                  <a:ea typeface="Cambria Math" panose="02040503050406030204" pitchFamily="18" charset="0"/>
                                   <a:cs typeface="Times New Roman" panose="02020603050405020304" pitchFamily="18" charset="0"/>
                                 </a:rPr>
-                                <m:t>𝜃</m:t>
+                                <m:t>𝑤</m:t>
                               </m:r>
                             </m:e>
                           </m:acc>
@@ -6277,6 +6302,16 @@
                               <a:cs typeface="Times New Roman" panose="02020603050405020304" pitchFamily="18" charset="0"/>
                             </a:rPr>
                             <m:t>𝑡</m:t>
+                          </m:r>
+                          <m:r>
+                            <a:rPr lang="en-US" altLang="zh-CN" b="0" i="1" smtClean="0">
+                              <a:solidFill>
+                                <a:srgbClr val="000000"/>
+                              </a:solidFill>
+                              <a:latin typeface="Cambria Math" panose="02040503050406030204" pitchFamily="18" charset="0"/>
+                              <a:cs typeface="Times New Roman" panose="02020603050405020304" pitchFamily="18" charset="0"/>
+                            </a:rPr>
+                            <m:t>+1</m:t>
                           </m:r>
                         </m:sub>
                       </m:sSub>
@@ -6320,16 +6355,16 @@
                             </m:sSubPr>
                             <m:e>
                               <m:r>
-                                <a:rPr lang="en-US" sz="1800" i="1" kern="1200">
+                                <a:rPr lang="en-US" altLang="zh-CN" sz="1800" b="0" i="1" kern="1200" smtClean="0">
                                   <a:solidFill>
                                     <a:srgbClr val="A6A6A6"/>
                                   </a:solidFill>
                                   <a:effectLst/>
                                   <a:latin typeface="Cambria Math" panose="02040503050406030204" pitchFamily="18" charset="0"/>
-                                  <a:ea typeface="等线" panose="02010600030101010101" pitchFamily="2" charset="-122"/>
+                                  <a:ea typeface="Cambria Math" panose="02040503050406030204" pitchFamily="18" charset="0"/>
                                   <a:cs typeface="Times New Roman" panose="02020603050405020304" pitchFamily="18" charset="0"/>
                                 </a:rPr>
-                                <m:t>𝜃</m:t>
+                                <m:t>𝑤</m:t>
                               </m:r>
                             </m:e>
                             <m:sub>
@@ -6344,18 +6379,6 @@
                                   <a:cs typeface="Times New Roman" panose="02020603050405020304" pitchFamily="18" charset="0"/>
                                 </a:rPr>
                                 <m:t>𝑡</m:t>
-                              </m:r>
-                              <m:r>
-                                <a:rPr lang="en-US" sz="1800" i="1" kern="1200">
-                                  <a:solidFill>
-                                    <a:srgbClr val="A6A6A6"/>
-                                  </a:solidFill>
-                                  <a:effectLst/>
-                                  <a:latin typeface="Cambria Math" panose="02040503050406030204" pitchFamily="18" charset="0"/>
-                                  <a:ea typeface="等线" panose="02010600030101010101" pitchFamily="2" charset="-122"/>
-                                  <a:cs typeface="Times New Roman" panose="02020603050405020304" pitchFamily="18" charset="0"/>
-                                </a:rPr>
-                                <m:t>−1</m:t>
                               </m:r>
                             </m:sub>
                           </m:sSub>
@@ -6443,7 +6466,7 @@
             </p:txBody>
           </p:sp>
         </mc:Choice>
-        <mc:Fallback xmlns="">
+        <mc:Fallback>
           <p:sp>
             <p:nvSpPr>
               <p:cNvPr id="86" name="文本框 79">
@@ -6461,7 +6484,7 @@
             <p:spPr>
               <a:xfrm>
                 <a:off x="4064789" y="409642"/>
-                <a:ext cx="4402417" cy="991938"/>
+                <a:ext cx="4402417" cy="968470"/>
               </a:xfrm>
               <a:prstGeom prst="rect">
                 <a:avLst/>
@@ -6469,7 +6492,7 @@
               <a:blipFill>
                 <a:blip r:embed="rId7"/>
                 <a:stretch>
-                  <a:fillRect l="-1724" t="-2532" b="-3797"/>
+                  <a:fillRect l="-1149" b="-2564"/>
                 </a:stretch>
               </a:blipFill>
             </p:spPr>
@@ -7282,8 +7305,8 @@
         </p:nvSpPr>
         <p:spPr>
           <a:xfrm>
-            <a:off x="5823281" y="3016007"/>
-            <a:ext cx="1640348" cy="369332"/>
+            <a:off x="5436524" y="3016007"/>
+            <a:ext cx="2369127" cy="369332"/>
           </a:xfrm>
           <a:prstGeom prst="rect">
             <a:avLst/>
@@ -7296,6 +7319,7 @@
           </a:bodyPr>
           <a:lstStyle/>
           <a:p>
+            <a:pPr algn="ctr"/>
             <a:r>
               <a:rPr lang="en-US" altLang="zh-CN" dirty="0">
                 <a:ln>
@@ -7303,6 +7327,9 @@
                     <a:schemeClr val="accent6"/>
                   </a:solidFill>
                 </a:ln>
+                <a:solidFill>
+                  <a:schemeClr val="accent6"/>
+                </a:solidFill>
               </a:rPr>
               <a:t>Weight Clip</a:t>
             </a:r>
@@ -7312,6 +7339,9 @@
                   <a:schemeClr val="accent6"/>
                 </a:solidFill>
               </a:ln>
+              <a:solidFill>
+                <a:schemeClr val="accent6"/>
+              </a:solidFill>
             </a:endParaRPr>
           </a:p>
         </p:txBody>
@@ -7330,8 +7360,8 @@
         </p:nvSpPr>
         <p:spPr>
           <a:xfrm>
-            <a:off x="3900345" y="2653295"/>
-            <a:ext cx="1017554" cy="646331"/>
+            <a:off x="4806940" y="2478544"/>
+            <a:ext cx="1590873" cy="369332"/>
           </a:xfrm>
           <a:prstGeom prst="rect">
             <a:avLst/>
@@ -7351,6 +7381,9 @@
                     <a:srgbClr val="00B0F0"/>
                   </a:solidFill>
                 </a:ln>
+                <a:solidFill>
+                  <a:schemeClr val="accent5"/>
+                </a:solidFill>
               </a:rPr>
               <a:t>Weight Decay</a:t>
             </a:r>
@@ -7360,6 +7393,9 @@
                   <a:srgbClr val="00B0F0"/>
                 </a:solidFill>
               </a:ln>
+              <a:solidFill>
+                <a:schemeClr val="accent5"/>
+              </a:solidFill>
             </a:endParaRPr>
           </a:p>
         </p:txBody>
@@ -7468,8 +7504,8 @@
         </p:nvSpPr>
         <p:spPr>
           <a:xfrm>
-            <a:off x="6018037" y="4350794"/>
-            <a:ext cx="1282723" cy="369332"/>
+            <a:off x="5436524" y="4350794"/>
+            <a:ext cx="2369127" cy="369332"/>
           </a:xfrm>
           <a:prstGeom prst="rect">
             <a:avLst/>
@@ -7482,6 +7518,7 @@
           </a:bodyPr>
           <a:lstStyle/>
           <a:p>
+            <a:pPr algn="ctr"/>
             <a:r>
               <a:rPr lang="en-US" altLang="zh-CN" dirty="0">
                 <a:solidFill>
@@ -7557,8 +7594,8 @@
         </p:nvSpPr>
         <p:spPr>
           <a:xfrm>
-            <a:off x="5685413" y="3689224"/>
-            <a:ext cx="1947969" cy="369332"/>
+            <a:off x="5436524" y="3689224"/>
+            <a:ext cx="2369127" cy="369332"/>
           </a:xfrm>
           <a:prstGeom prst="rect">
             <a:avLst/>
@@ -7566,11 +7603,12 @@
           <a:noFill/>
         </p:spPr>
         <p:txBody>
-          <a:bodyPr wrap="none" rtlCol="0">
+          <a:bodyPr wrap="square" rtlCol="0">
             <a:spAutoFit/>
           </a:bodyPr>
           <a:lstStyle/>
           <a:p>
+            <a:pPr algn="ctr"/>
             <a:r>
               <a:rPr lang="en-US" altLang="zh-CN" dirty="0"/>
               <a:t>Region of Interest</a:t>

</xml_diff>